<commit_message>
Finish a first version of the SHMEM Analyzer slides
</commit_message>
<xml_diff>
--- a/SHMEM-Analyzer.pptx
+++ b/SHMEM-Analyzer.pptx
@@ -5,25 +5,24 @@
     <p:sldMasterId id="2147483912" r:id="rId1"/>
   </p:sldMasterIdLst>
   <p:notesMasterIdLst>
-    <p:notesMasterId r:id="rId15"/>
+    <p:notesMasterId r:id="rId14"/>
   </p:notesMasterIdLst>
   <p:handoutMasterIdLst>
-    <p:handoutMasterId r:id="rId16"/>
+    <p:handoutMasterId r:id="rId15"/>
   </p:handoutMasterIdLst>
   <p:sldIdLst>
     <p:sldId id="256" r:id="rId2"/>
     <p:sldId id="278" r:id="rId3"/>
     <p:sldId id="257" r:id="rId4"/>
     <p:sldId id="272" r:id="rId5"/>
-    <p:sldId id="258" r:id="rId6"/>
-    <p:sldId id="277" r:id="rId7"/>
-    <p:sldId id="276" r:id="rId8"/>
-    <p:sldId id="275" r:id="rId9"/>
-    <p:sldId id="261" r:id="rId10"/>
-    <p:sldId id="273" r:id="rId11"/>
-    <p:sldId id="268" r:id="rId12"/>
-    <p:sldId id="266" r:id="rId13"/>
-    <p:sldId id="264" r:id="rId14"/>
+    <p:sldId id="277" r:id="rId6"/>
+    <p:sldId id="276" r:id="rId7"/>
+    <p:sldId id="275" r:id="rId8"/>
+    <p:sldId id="261" r:id="rId9"/>
+    <p:sldId id="273" r:id="rId10"/>
+    <p:sldId id="268" r:id="rId11"/>
+    <p:sldId id="266" r:id="rId12"/>
+    <p:sldId id="264" r:id="rId13"/>
   </p:sldIdLst>
   <p:sldSz cx="9144000" cy="6858000" type="screen4x3"/>
   <p:notesSz cx="6858000" cy="9144000"/>
@@ -207,7 +206,7 @@
           <a:p>
             <a:fld id="{468D709A-6F93-AB45-86F2-C0AA7B66AC74}" type="datetime1">
               <a:rPr lang="en-US" smtClean="0"/>
-              <a:t>9/5/14</a:t>
+              <a:t>9/6/14</a:t>
             </a:fld>
             <a:endParaRPr lang="en-US"/>
           </a:p>
@@ -373,7 +372,7 @@
           <a:p>
             <a:fld id="{854BB43F-43C0-CA46-9D03-411B571943D9}" type="datetime1">
               <a:rPr lang="en-US" smtClean="0"/>
-              <a:t>9/5/14</a:t>
+              <a:t>9/6/14</a:t>
             </a:fld>
             <a:endParaRPr lang="en-US"/>
           </a:p>
@@ -686,6 +685,26 @@
           <a:bodyPr/>
           <a:lstStyle/>
           <a:p>
+            <a:r>
+              <a:rPr lang="en-US" dirty="0" smtClean="0"/>
+              <a:t>Library based models such as </a:t>
+            </a:r>
+            <a:r>
+              <a:rPr lang="en-US" dirty="0" err="1" smtClean="0"/>
+              <a:t>OpenSHMEM</a:t>
+            </a:r>
+            <a:r>
+              <a:rPr lang="en-US" baseline="0" dirty="0" smtClean="0"/>
+              <a:t> is treated  as a </a:t>
+            </a:r>
+            <a:r>
+              <a:rPr lang="en-US" baseline="0" dirty="0" err="1" smtClean="0"/>
+              <a:t>blackbox</a:t>
+            </a:r>
+            <a:r>
+              <a:rPr lang="en-US" baseline="0" dirty="0" smtClean="0"/>
+              <a:t> for the compiler and do not benefit from the same semantic checking capabilities offered to a language</a:t>
+            </a:r>
             <a:endParaRPr lang="en-US" dirty="0"/>
           </a:p>
         </p:txBody>
@@ -707,7 +726,7 @@
           <a:p>
             <a:fld id="{689CB50F-1E04-014F-81B6-285FD1BAB429}" type="slidenum">
               <a:rPr lang="en-US" smtClean="0"/>
-              <a:t>5</a:t>
+              <a:t>4</a:t>
             </a:fld>
             <a:endParaRPr lang="en-US"/>
           </a:p>
@@ -716,7 +735,7 @@
     </p:spTree>
     <p:extLst>
       <p:ext uri="{BB962C8B-B14F-4D97-AF65-F5344CB8AC3E}">
-        <p14:creationId xmlns:p14="http://schemas.microsoft.com/office/powerpoint/2010/main" val="3673389980"/>
+        <p14:creationId xmlns:p14="http://schemas.microsoft.com/office/powerpoint/2010/main" val="2616261103"/>
       </p:ext>
     </p:extLst>
   </p:cSld>
@@ -854,7 +873,7 @@
           <a:p>
             <a:fld id="{689CB50F-1E04-014F-81B6-285FD1BAB429}" type="slidenum">
               <a:rPr lang="en-US" smtClean="0"/>
-              <a:t>6</a:t>
+              <a:t>5</a:t>
             </a:fld>
             <a:endParaRPr lang="en-US"/>
           </a:p>
@@ -917,124 +936,6 @@
           <a:bodyPr/>
           <a:lstStyle/>
           <a:p>
-            <a:r>
-              <a:rPr lang="en-US" sz="1200" dirty="0" smtClean="0"/>
-              <a:t>Installation instructions:</a:t>
-            </a:r>
-          </a:p>
-          <a:p>
-            <a:endParaRPr lang="en-US" sz="1200" dirty="0" smtClean="0"/>
-          </a:p>
-          <a:p>
-            <a:r>
-              <a:rPr lang="en-US" sz="1200" dirty="0" smtClean="0"/>
-              <a:t>Install code2html 0.9.1</a:t>
-            </a:r>
-          </a:p>
-          <a:p>
-            <a:r>
-              <a:rPr lang="en-US" sz="1200" dirty="0" smtClean="0"/>
-              <a:t>http://</a:t>
-            </a:r>
-            <a:r>
-              <a:rPr lang="en-US" sz="1200" dirty="0" err="1" smtClean="0"/>
-              <a:t>www.palfrader.org</a:t>
-            </a:r>
-            <a:r>
-              <a:rPr lang="en-US" sz="1200" dirty="0" smtClean="0"/>
-              <a:t>/code2html/</a:t>
-            </a:r>
-          </a:p>
-          <a:p>
-            <a:r>
-              <a:rPr lang="en-US" sz="1200" dirty="0" smtClean="0"/>
-              <a:t>Use current .</a:t>
-            </a:r>
-            <a:r>
-              <a:rPr lang="en-US" sz="1200" dirty="0" err="1" smtClean="0"/>
-              <a:t>tar.gz</a:t>
-            </a:r>
-            <a:r>
-              <a:rPr lang="en-US" sz="1200" dirty="0" smtClean="0"/>
-              <a:t> file)</a:t>
-            </a:r>
-          </a:p>
-          <a:p>
-            <a:endParaRPr lang="en-US" sz="1200" dirty="0" smtClean="0"/>
-          </a:p>
-          <a:p>
-            <a:r>
-              <a:rPr lang="en-US" sz="1200" dirty="0" smtClean="0"/>
-              <a:t>Note: Make sure to add the path to 'code2html' to your $PATH</a:t>
-            </a:r>
-          </a:p>
-          <a:p>
-            <a:endParaRPr lang="en-US" sz="1200" dirty="0" smtClean="0"/>
-          </a:p>
-          <a:p>
-            <a:r>
-              <a:rPr lang="en-US" sz="1200" dirty="0" smtClean="0"/>
-              <a:t>Install </a:t>
-            </a:r>
-            <a:r>
-              <a:rPr lang="en-US" sz="1200" dirty="0" err="1" smtClean="0"/>
-              <a:t>graphviz</a:t>
-            </a:r>
-            <a:r>
-              <a:rPr lang="en-US" sz="1200" dirty="0" smtClean="0"/>
-              <a:t> 2.28.0</a:t>
-            </a:r>
-          </a:p>
-          <a:p>
-            <a:r>
-              <a:rPr lang="en-US" sz="1200" dirty="0" smtClean="0"/>
-              <a:t>http://</a:t>
-            </a:r>
-            <a:r>
-              <a:rPr lang="en-US" sz="1200" dirty="0" err="1" smtClean="0"/>
-              <a:t>www.graphviz.org</a:t>
-            </a:r>
-            <a:r>
-              <a:rPr lang="en-US" sz="1200" dirty="0" smtClean="0"/>
-              <a:t>/</a:t>
-            </a:r>
-          </a:p>
-          <a:p>
-            <a:r>
-              <a:rPr lang="en-US" sz="1200" dirty="0" smtClean="0"/>
-              <a:t>Use current .</a:t>
-            </a:r>
-            <a:r>
-              <a:rPr lang="en-US" sz="1200" dirty="0" err="1" smtClean="0"/>
-              <a:t>tar.gz</a:t>
-            </a:r>
-            <a:r>
-              <a:rPr lang="en-US" sz="1200" dirty="0" smtClean="0"/>
-              <a:t> file</a:t>
-            </a:r>
-          </a:p>
-          <a:p>
-            <a:endParaRPr lang="en-US" sz="1200" dirty="0" smtClean="0"/>
-          </a:p>
-          <a:p>
-            <a:r>
-              <a:rPr lang="en-US" sz="1200" dirty="0" smtClean="0"/>
-              <a:t>Recommended Configuration: ./configure --prefix=&lt;install directory&gt; --enable-python=no</a:t>
-            </a:r>
-          </a:p>
-          <a:p>
-            <a:r>
-              <a:rPr lang="en-US" sz="1200" dirty="0" smtClean="0"/>
-              <a:t>Note: Make sure to add the path to 'dot' to your $PATH</a:t>
-            </a:r>
-          </a:p>
-          <a:p>
-            <a:endParaRPr lang="en-US" sz="1200" dirty="0" smtClean="0"/>
-          </a:p>
-          <a:p>
-            <a:endParaRPr lang="en-US" sz="1200" dirty="0" smtClean="0"/>
-          </a:p>
-          <a:p>
             <a:endParaRPr lang="en-US" dirty="0"/>
           </a:p>
         </p:txBody>
@@ -1056,7 +957,7 @@
           <a:p>
             <a:fld id="{689CB50F-1E04-014F-81B6-285FD1BAB429}" type="slidenum">
               <a:rPr lang="en-US" smtClean="0"/>
-              <a:t>7</a:t>
+              <a:t>6</a:t>
             </a:fld>
             <a:endParaRPr lang="en-US"/>
           </a:p>
@@ -1140,7 +1041,7 @@
           <a:p>
             <a:fld id="{689CB50F-1E04-014F-81B6-285FD1BAB429}" type="slidenum">
               <a:rPr lang="en-US" smtClean="0"/>
-              <a:t>8</a:t>
+              <a:t>7</a:t>
             </a:fld>
             <a:endParaRPr lang="en-US"/>
           </a:p>
@@ -1342,7 +1243,7 @@
           <a:p>
             <a:fld id="{689CB50F-1E04-014F-81B6-285FD1BAB429}" type="slidenum">
               <a:rPr lang="en-US" smtClean="0"/>
-              <a:t>10</a:t>
+              <a:t>9</a:t>
             </a:fld>
             <a:endParaRPr lang="en-US"/>
           </a:p>
@@ -1441,7 +1342,7 @@
           <a:p>
             <a:fld id="{689CB50F-1E04-014F-81B6-285FD1BAB429}" type="slidenum">
               <a:rPr lang="en-US" smtClean="0"/>
-              <a:t>12</a:t>
+              <a:t>11</a:t>
             </a:fld>
             <a:endParaRPr lang="en-US"/>
           </a:p>
@@ -1641,7 +1542,7 @@
           <a:p>
             <a:fld id="{689CB50F-1E04-014F-81B6-285FD1BAB429}" type="slidenum">
               <a:rPr lang="en-US" smtClean="0"/>
-              <a:t>13</a:t>
+              <a:t>12</a:t>
             </a:fld>
             <a:endParaRPr lang="en-US"/>
           </a:p>
@@ -1853,7 +1754,7 @@
           <a:p>
             <a:fld id="{469B110A-2C91-A143-A0D6-D87B179152F8}" type="datetime4">
               <a:rPr lang="en-US" smtClean="0"/>
-              <a:t>September 5, 2014</a:t>
+              <a:t>September 6, 2014</a:t>
             </a:fld>
             <a:endParaRPr lang="en-US" dirty="0"/>
           </a:p>
@@ -2119,7 +2020,7 @@
           <a:p>
             <a:fld id="{3EC81CD4-BD3D-464B-9184-78FFC2E97AD9}" type="datetime4">
               <a:rPr lang="en-US" smtClean="0"/>
-              <a:t>September 5, 2014</a:t>
+              <a:t>September 6, 2014</a:t>
             </a:fld>
             <a:endParaRPr lang="en-US"/>
           </a:p>
@@ -2295,7 +2196,7 @@
           <a:p>
             <a:fld id="{CA6DA6AF-E785-EF40-A581-BDE4D55F4ABA}" type="datetime4">
               <a:rPr lang="en-US" smtClean="0"/>
-              <a:t>September 5, 2014</a:t>
+              <a:t>September 6, 2014</a:t>
             </a:fld>
             <a:endParaRPr lang="en-US"/>
           </a:p>
@@ -2461,7 +2362,7 @@
           <a:p>
             <a:fld id="{457379AA-32F7-BC40-9E82-84EE7D640F64}" type="datetime4">
               <a:rPr lang="en-US" smtClean="0"/>
-              <a:t>September 5, 2014</a:t>
+              <a:t>September 6, 2014</a:t>
             </a:fld>
             <a:endParaRPr lang="en-US"/>
           </a:p>
@@ -2711,7 +2612,7 @@
           <a:p>
             <a:fld id="{3F46DDC9-55D1-6447-8F23-EB2832B98E47}" type="datetime4">
               <a:rPr lang="en-US" smtClean="0"/>
-              <a:t>September 5, 2014</a:t>
+              <a:t>September 6, 2014</a:t>
             </a:fld>
             <a:endParaRPr lang="en-US" dirty="0"/>
           </a:p>
@@ -2995,7 +2896,7 @@
           <a:p>
             <a:fld id="{BDF42959-6026-844A-8D3C-629F6071B1F6}" type="datetime4">
               <a:rPr lang="en-US" smtClean="0"/>
-              <a:t>September 5, 2014</a:t>
+              <a:t>September 6, 2014</a:t>
             </a:fld>
             <a:endParaRPr lang="en-US"/>
           </a:p>
@@ -3435,7 +3336,7 @@
           <a:p>
             <a:fld id="{AFAD780A-6800-8948-A870-36DD091D20EA}" type="datetime4">
               <a:rPr lang="en-US" smtClean="0"/>
-              <a:t>September 5, 2014</a:t>
+              <a:t>September 6, 2014</a:t>
             </a:fld>
             <a:endParaRPr lang="en-US"/>
           </a:p>
@@ -3549,7 +3450,7 @@
           <a:p>
             <a:fld id="{137FFFEB-36CF-1E46-8135-84F055D6EA5C}" type="datetime4">
               <a:rPr lang="en-US" smtClean="0"/>
-              <a:t>September 5, 2014</a:t>
+              <a:t>September 6, 2014</a:t>
             </a:fld>
             <a:endParaRPr lang="en-US"/>
           </a:p>
@@ -3640,7 +3541,7 @@
           <a:p>
             <a:fld id="{009ED1FD-968B-914C-B6B5-7B0352053ED7}" type="datetime4">
               <a:rPr lang="en-US" smtClean="0"/>
-              <a:t>September 5, 2014</a:t>
+              <a:t>September 6, 2014</a:t>
             </a:fld>
             <a:endParaRPr lang="en-US"/>
           </a:p>
@@ -3883,7 +3784,7 @@
           <a:p>
             <a:fld id="{0FB22B12-5DCA-944A-90D8-136439A8444C}" type="datetime4">
               <a:rPr lang="en-US" smtClean="0"/>
-              <a:t>September 5, 2014</a:t>
+              <a:t>September 6, 2014</a:t>
             </a:fld>
             <a:endParaRPr lang="en-US"/>
           </a:p>
@@ -4178,7 +4079,7 @@
           <a:p>
             <a:fld id="{412CBBBA-55E0-1146-80D4-5ECBA942EF9C}" type="datetime4">
               <a:rPr lang="en-US" smtClean="0"/>
-              <a:t>September 5, 2014</a:t>
+              <a:t>September 6, 2014</a:t>
             </a:fld>
             <a:endParaRPr lang="en-US"/>
           </a:p>
@@ -4473,7 +4374,7 @@
           <a:p>
             <a:fld id="{B478DFC0-2A2A-DE4F-8853-E62D51D9AECD}" type="datetime4">
               <a:rPr lang="en-US" smtClean="0"/>
-              <a:t>September 5, 2014</a:t>
+              <a:t>September 6, 2014</a:t>
             </a:fld>
             <a:endParaRPr lang="en-US" dirty="0"/>
           </a:p>
@@ -5023,7 +4924,7 @@
       </p:sp>
       <p:pic>
         <p:nvPicPr>
-          <p:cNvPr id="8" name="Picture 7" descr="hpctools.jpg"/>
+          <p:cNvPr id="3" name="Picture 2" descr="shmem-logo.jpg"/>
           <p:cNvPicPr>
             <a:picLocks noChangeAspect="1"/>
           </p:cNvPicPr>
@@ -5031,36 +4932,6 @@
         </p:nvPicPr>
         <p:blipFill>
           <a:blip r:embed="rId2">
-            <a:extLst>
-              <a:ext uri="{28A0092B-C50C-407E-A947-70E740481C1C}">
-                <a14:useLocalDpi xmlns:a14="http://schemas.microsoft.com/office/drawing/2010/main" val="0"/>
-              </a:ext>
-            </a:extLst>
-          </a:blip>
-          <a:stretch>
-            <a:fillRect/>
-          </a:stretch>
-        </p:blipFill>
-        <p:spPr>
-          <a:xfrm>
-            <a:off x="457200" y="6149492"/>
-            <a:ext cx="2349500" cy="588855"/>
-          </a:xfrm>
-          <a:prstGeom prst="rect">
-            <a:avLst/>
-          </a:prstGeom>
-        </p:spPr>
-      </p:pic>
-      <p:pic>
-        <p:nvPicPr>
-          <p:cNvPr id="3" name="Picture 2" descr="shmem-logo.jpg"/>
-          <p:cNvPicPr>
-            <a:picLocks noChangeAspect="1"/>
-          </p:cNvPicPr>
-          <p:nvPr/>
-        </p:nvPicPr>
-        <p:blipFill>
-          <a:blip r:embed="rId3">
             <a:extLst>
               <a:ext uri="{28A0092B-C50C-407E-A947-70E740481C1C}">
                 <a14:useLocalDpi xmlns:a14="http://schemas.microsoft.com/office/drawing/2010/main" val="0"/>
@@ -5081,6 +4952,46 @@
           </a:prstGeom>
         </p:spPr>
       </p:pic>
+      <p:sp>
+        <p:nvSpPr>
+          <p:cNvPr id="4" name="TextBox 3"/>
+          <p:cNvSpPr txBox="1"/>
+          <p:nvPr/>
+        </p:nvSpPr>
+        <p:spPr>
+          <a:xfrm>
+            <a:off x="2806700" y="3476625"/>
+            <a:ext cx="3590925" cy="954107"/>
+          </a:xfrm>
+          <a:prstGeom prst="rect">
+            <a:avLst/>
+          </a:prstGeom>
+          <a:noFill/>
+        </p:spPr>
+        <p:txBody>
+          <a:bodyPr wrap="square" rtlCol="0">
+            <a:spAutoFit/>
+          </a:bodyPr>
+          <a:lstStyle/>
+          <a:p>
+            <a:r>
+              <a:rPr lang="en-US" sz="2800" b="1" dirty="0" smtClean="0"/>
+              <a:t>Presented by:</a:t>
+            </a:r>
+          </a:p>
+          <a:p>
+            <a:r>
+              <a:rPr lang="en-US" sz="2800" b="1" dirty="0"/>
+              <a:t>	</a:t>
+            </a:r>
+            <a:r>
+              <a:rPr lang="en-US" sz="2800" b="1" dirty="0" smtClean="0"/>
+              <a:t>Dounia Khaldi</a:t>
+            </a:r>
+            <a:endParaRPr lang="en-US" sz="2800" b="1" dirty="0"/>
+          </a:p>
+        </p:txBody>
+      </p:sp>
     </p:spTree>
     <p:extLst>
       <p:ext uri="{BB962C8B-B14F-4D97-AF65-F5344CB8AC3E}">
@@ -5128,14 +5039,29 @@
             <p:ph type="title"/>
           </p:nvPr>
         </p:nvSpPr>
-        <p:spPr/>
-        <p:txBody>
-          <a:bodyPr/>
+        <p:spPr>
+          <a:xfrm>
+            <a:off x="1044574" y="152718"/>
+            <a:ext cx="7004051" cy="1371600"/>
+          </a:xfrm>
+        </p:spPr>
+        <p:txBody>
+          <a:bodyPr>
+            <a:normAutofit/>
+          </a:bodyPr>
           <a:lstStyle/>
           <a:p>
             <a:r>
               <a:rPr lang="en-US" dirty="0" smtClean="0"/>
-              <a:t>How to install</a:t>
+              <a:t>How to use </a:t>
+            </a:r>
+            <a:r>
+              <a:rPr lang="en-US" dirty="0" err="1" smtClean="0"/>
+              <a:t>OpenSHMEM</a:t>
+            </a:r>
+            <a:r>
+              <a:rPr lang="en-US" dirty="0" smtClean="0"/>
+              <a:t> Analyzer (Demo)</a:t>
             </a:r>
             <a:endParaRPr lang="en-US" dirty="0"/>
           </a:p>
@@ -5143,7 +5069,7 @@
       </p:sp>
       <p:sp>
         <p:nvSpPr>
-          <p:cNvPr id="9" name="Slide Number Placeholder 8"/>
+          <p:cNvPr id="5" name="Slide Number Placeholder 4"/>
           <p:cNvSpPr>
             <a:spLocks noGrp="1"/>
           </p:cNvSpPr>
@@ -5161,143 +5087,120 @@
               <a:pPr/>
               <a:t>10</a:t>
             </a:fld>
-            <a:endParaRPr lang="en-US" dirty="0"/>
-          </a:p>
-        </p:txBody>
-      </p:sp>
-      <p:sp>
-        <p:nvSpPr>
-          <p:cNvPr id="3" name="TextBox 2"/>
-          <p:cNvSpPr txBox="1"/>
+            <a:endParaRPr lang="en-US"/>
+          </a:p>
+        </p:txBody>
+      </p:sp>
+      <p:sp>
+        <p:nvSpPr>
+          <p:cNvPr id="4" name="Rectangle 3"/>
+          <p:cNvSpPr/>
           <p:nvPr/>
         </p:nvSpPr>
         <p:spPr>
           <a:xfrm>
-            <a:off x="2254250" y="2905125"/>
-            <a:ext cx="184666" cy="369332"/>
+            <a:off x="571500" y="1997839"/>
+            <a:ext cx="7747000" cy="2677656"/>
           </a:xfrm>
           <a:prstGeom prst="rect">
             <a:avLst/>
           </a:prstGeom>
-          <a:noFill/>
         </p:spPr>
         <p:txBody>
-          <a:bodyPr wrap="none" rtlCol="0">
+          <a:bodyPr wrap="square">
             <a:spAutoFit/>
           </a:bodyPr>
           <a:lstStyle/>
           <a:p>
-            <a:endParaRPr lang="en-US" dirty="0"/>
-          </a:p>
-        </p:txBody>
-      </p:sp>
-      <p:sp>
-        <p:nvSpPr>
-          <p:cNvPr id="7" name="Content Placeholder 2"/>
-          <p:cNvSpPr>
-            <a:spLocks noGrp="1"/>
-          </p:cNvSpPr>
-          <p:nvPr>
-            <p:ph idx="1"/>
-          </p:nvPr>
-        </p:nvSpPr>
-        <p:spPr>
-          <a:xfrm>
-            <a:off x="154669" y="1932398"/>
-            <a:ext cx="8229600" cy="4533900"/>
-          </a:xfrm>
-        </p:spPr>
-        <p:txBody>
-          <a:bodyPr>
-            <a:normAutofit/>
-          </a:bodyPr>
-          <a:lstStyle/>
-          <a:p>
-            <a:pPr marL="285750" indent="-285750">
+            <a:pPr marL="457200" indent="-457200">
               <a:buFont typeface="Wingdings" charset="2"/>
               <a:buChar char="§"/>
             </a:pPr>
             <a:r>
-              <a:rPr lang="en-US" sz="1400" dirty="0" smtClean="0"/>
-              <a:t>Install </a:t>
-            </a:r>
-            <a:r>
-              <a:rPr lang="en-US" sz="1400" dirty="0" err="1" smtClean="0"/>
-              <a:t>OpenUH</a:t>
-            </a:r>
-            <a:r>
-              <a:rPr lang="en-US" sz="1400" dirty="0" smtClean="0"/>
-              <a:t> 3.0.38 (http</a:t>
-            </a:r>
-            <a:r>
-              <a:rPr lang="en-US" sz="1400" dirty="0"/>
-              <a:t>://</a:t>
-            </a:r>
-            <a:r>
-              <a:rPr lang="en-US" sz="1400" dirty="0" err="1"/>
-              <a:t>web.cs.uh.edu</a:t>
-            </a:r>
-            <a:r>
-              <a:rPr lang="en-US" sz="1400" dirty="0"/>
-              <a:t>/~</a:t>
-            </a:r>
-            <a:r>
-              <a:rPr lang="en-US" sz="1400" dirty="0" err="1"/>
-              <a:t>openuh</a:t>
-            </a:r>
-            <a:r>
-              <a:rPr lang="en-US" sz="1400" dirty="0"/>
-              <a:t>/download</a:t>
-            </a:r>
-            <a:r>
-              <a:rPr lang="en-US" sz="1400" dirty="0" smtClean="0"/>
-              <a:t>/)</a:t>
-            </a:r>
-          </a:p>
-          <a:p>
-            <a:pPr marL="285750" indent="-285750">
+              <a:rPr lang="en-US" sz="2800" dirty="0" smtClean="0"/>
+              <a:t>Hints </a:t>
+            </a:r>
+            <a:r>
+              <a:rPr lang="en-US" sz="2800" dirty="0"/>
+              <a:t>on preparing programs for </a:t>
+            </a:r>
+            <a:r>
+              <a:rPr lang="en-US" sz="2800" dirty="0" smtClean="0"/>
+              <a:t>OSA</a:t>
+            </a:r>
+          </a:p>
+          <a:p>
+            <a:pPr marL="457200" indent="-457200">
               <a:buFont typeface="Wingdings" charset="2"/>
               <a:buChar char="§"/>
             </a:pPr>
             <a:r>
-              <a:rPr lang="en-US" sz="1400" dirty="0" smtClean="0"/>
-              <a:t>Packages to Install:</a:t>
-            </a:r>
-          </a:p>
-          <a:p>
-            <a:pPr marL="742950" lvl="1" indent="-285750">
+              <a:rPr lang="en-US" sz="2800" dirty="0" smtClean="0"/>
+              <a:t>Visualization of results and manipulating </a:t>
+            </a:r>
+            <a:r>
+              <a:rPr lang="en-US" sz="2800" dirty="0" smtClean="0"/>
+              <a:t>graphs</a:t>
+            </a:r>
+          </a:p>
+          <a:p>
+            <a:pPr marL="457200" indent="-457200">
               <a:buFont typeface="Wingdings" charset="2"/>
               <a:buChar char="§"/>
             </a:pPr>
             <a:r>
-              <a:rPr lang="en-US" sz="1400" dirty="0" smtClean="0"/>
-              <a:t>Code2html</a:t>
-            </a:r>
-          </a:p>
-          <a:p>
-            <a:pPr marL="742950" lvl="1" indent="-285750">
+              <a:rPr lang="en-US" sz="2800" dirty="0" smtClean="0"/>
+              <a:t>Demo videos are here</a:t>
+            </a:r>
+            <a:r>
+              <a:rPr lang="en-US" sz="2800" i="1" dirty="0" smtClean="0"/>
+              <a:t> </a:t>
+            </a:r>
+          </a:p>
+          <a:p>
+            <a:r>
+              <a:rPr lang="en-US" sz="2800" b="1" i="1" dirty="0" smtClean="0"/>
+              <a:t> http</a:t>
+            </a:r>
+            <a:r>
+              <a:rPr lang="en-US" sz="2800" b="1" i="1" dirty="0"/>
+              <a:t>://</a:t>
+            </a:r>
+            <a:r>
+              <a:rPr lang="en-US" sz="2800" b="1" i="1" dirty="0" err="1"/>
+              <a:t>web.cs.uh.edu</a:t>
+            </a:r>
+            <a:r>
+              <a:rPr lang="en-US" sz="2800" b="1" i="1" dirty="0"/>
+              <a:t>/~</a:t>
+            </a:r>
+            <a:r>
+              <a:rPr lang="en-US" sz="2800" b="1" i="1" dirty="0" err="1"/>
+              <a:t>hpctools</a:t>
+            </a:r>
+            <a:r>
+              <a:rPr lang="en-US" sz="2800" b="1" i="1" dirty="0"/>
+              <a:t>/</a:t>
+            </a:r>
+            <a:r>
+              <a:rPr lang="en-US" sz="2800" b="1" i="1" dirty="0" err="1"/>
+              <a:t>openshmem</a:t>
+            </a:r>
+            <a:endParaRPr lang="en-US" sz="2800" b="1" i="1" dirty="0"/>
+          </a:p>
+          <a:p>
+            <a:pPr marL="457200" indent="-457200">
               <a:buFont typeface="Wingdings" charset="2"/>
               <a:buChar char="§"/>
             </a:pPr>
-            <a:r>
-              <a:rPr lang="en-US" sz="1400" dirty="0" err="1" smtClean="0"/>
-              <a:t>Graphviz</a:t>
-            </a:r>
-            <a:endParaRPr lang="en-US" sz="1400" dirty="0" smtClean="0"/>
-          </a:p>
-          <a:p>
-            <a:pPr marL="285750" indent="-285750">
-              <a:buFont typeface="Wingdings" charset="2"/>
-              <a:buChar char="§"/>
-            </a:pPr>
-            <a:endParaRPr lang="en-US" sz="1400" dirty="0" smtClean="0"/>
+            <a:endParaRPr lang="en-US" sz="2800" dirty="0"/>
           </a:p>
         </p:txBody>
       </p:sp>
     </p:spTree>
     <p:extLst>
       <p:ext uri="{BB962C8B-B14F-4D97-AF65-F5344CB8AC3E}">
-        <p14:creationId xmlns:p14="http://schemas.microsoft.com/office/powerpoint/2010/main" val="2806564515"/>
+        <p14:creationId xmlns:p14="http://schemas.microsoft.com/office/powerpoint/2010/main" val="2033679312"/>
       </p:ext>
     </p:extLst>
   </p:cSld>
@@ -5341,10 +5244,33 @@
             <p:ph type="title"/>
           </p:nvPr>
         </p:nvSpPr>
+        <p:spPr/>
+        <p:txBody>
+          <a:bodyPr/>
+          <a:lstStyle/>
+          <a:p>
+            <a:r>
+              <a:rPr lang="en-US" dirty="0" smtClean="0"/>
+              <a:t>Conclusion</a:t>
+            </a:r>
+            <a:endParaRPr lang="en-US" dirty="0"/>
+          </a:p>
+        </p:txBody>
+      </p:sp>
+      <p:sp>
+        <p:nvSpPr>
+          <p:cNvPr id="3" name="Content Placeholder 2"/>
+          <p:cNvSpPr>
+            <a:spLocks noGrp="1"/>
+          </p:cNvSpPr>
+          <p:nvPr>
+            <p:ph idx="1"/>
+          </p:nvPr>
+        </p:nvSpPr>
         <p:spPr>
           <a:xfrm>
-            <a:off x="1044574" y="152718"/>
-            <a:ext cx="7004051" cy="1371600"/>
+            <a:off x="457199" y="1752600"/>
+            <a:ext cx="8245475" cy="4373563"/>
           </a:xfrm>
         </p:spPr>
         <p:txBody>
@@ -5353,19 +5279,62 @@
           </a:bodyPr>
           <a:lstStyle/>
           <a:p>
-            <a:r>
-              <a:rPr lang="en-US" dirty="0" smtClean="0"/>
-              <a:t>How to use </a:t>
-            </a:r>
-            <a:r>
-              <a:rPr lang="en-US" dirty="0" err="1" smtClean="0"/>
+            <a:pPr marL="457200" indent="-457200">
+              <a:buFont typeface="Wingdings" charset="2"/>
+              <a:buChar char="§"/>
+            </a:pPr>
+            <a:r>
+              <a:rPr lang="en-US" sz="2800" b="0" dirty="0" smtClean="0"/>
+              <a:t>Work in progress</a:t>
+            </a:r>
+          </a:p>
+          <a:p>
+            <a:pPr marL="457200" indent="-457200">
+              <a:buFont typeface="Wingdings" charset="2"/>
+              <a:buChar char="§"/>
+            </a:pPr>
+            <a:r>
+              <a:rPr lang="en-US" sz="2800" b="0" dirty="0" smtClean="0"/>
+              <a:t>Starting point for</a:t>
+            </a:r>
+          </a:p>
+          <a:p>
+            <a:pPr marL="914400" lvl="1" indent="-457200">
+              <a:buFont typeface="Wingdings" charset="2"/>
+              <a:buChar char="§"/>
+            </a:pPr>
+            <a:r>
+              <a:rPr lang="en-US" sz="2800" dirty="0" smtClean="0"/>
+              <a:t>Complete semantic awareness of </a:t>
+            </a:r>
+            <a:r>
+              <a:rPr lang="en-US" sz="2800" dirty="0" err="1" smtClean="0"/>
               <a:t>OpenSHMEM</a:t>
             </a:r>
             <a:r>
-              <a:rPr lang="en-US" dirty="0" smtClean="0"/>
-              <a:t> Analyzer (Demo)</a:t>
-            </a:r>
-            <a:endParaRPr lang="en-US" dirty="0"/>
+              <a:rPr lang="en-US" sz="2800" dirty="0" smtClean="0"/>
+              <a:t> in the compiler</a:t>
+            </a:r>
+            <a:endParaRPr lang="en-US" sz="2800" dirty="0"/>
+          </a:p>
+          <a:p>
+            <a:pPr marL="914400" lvl="1" indent="-457200">
+              <a:buFont typeface="Wingdings" charset="2"/>
+              <a:buChar char="§"/>
+            </a:pPr>
+            <a:r>
+              <a:rPr lang="en-US" sz="2800" dirty="0" smtClean="0"/>
+              <a:t>A</a:t>
+            </a:r>
+            <a:r>
+              <a:rPr lang="en-US" sz="2800" b="0" dirty="0" smtClean="0"/>
+              <a:t> comprehensive analysis and optimization framework for </a:t>
+            </a:r>
+            <a:r>
+              <a:rPr lang="en-US" sz="2800" b="0" dirty="0" err="1" smtClean="0"/>
+              <a:t>OpenSHMEM</a:t>
+            </a:r>
+            <a:endParaRPr lang="en-US" sz="2800" b="0" dirty="0" smtClean="0"/>
           </a:p>
         </p:txBody>
       </p:sp>
@@ -5393,61 +5362,10 @@
           </a:p>
         </p:txBody>
       </p:sp>
-      <p:sp>
-        <p:nvSpPr>
-          <p:cNvPr id="4" name="Rectangle 3"/>
-          <p:cNvSpPr/>
-          <p:nvPr/>
-        </p:nvSpPr>
-        <p:spPr>
-          <a:xfrm>
-            <a:off x="571500" y="1997839"/>
-            <a:ext cx="7747000" cy="1384995"/>
-          </a:xfrm>
-          <a:prstGeom prst="rect">
-            <a:avLst/>
-          </a:prstGeom>
-        </p:spPr>
-        <p:txBody>
-          <a:bodyPr wrap="square">
-            <a:spAutoFit/>
-          </a:bodyPr>
-          <a:lstStyle/>
-          <a:p>
-            <a:pPr marL="457200" indent="-457200">
-              <a:buFont typeface="Wingdings" charset="2"/>
-              <a:buChar char="§"/>
-            </a:pPr>
-            <a:r>
-              <a:rPr lang="en-US" sz="2800" dirty="0" smtClean="0"/>
-              <a:t>Hints </a:t>
-            </a:r>
-            <a:r>
-              <a:rPr lang="en-US" sz="2800" dirty="0"/>
-              <a:t>on preparing programs for </a:t>
-            </a:r>
-            <a:r>
-              <a:rPr lang="en-US" sz="2800" dirty="0" smtClean="0"/>
-              <a:t>OSA</a:t>
-            </a:r>
-          </a:p>
-          <a:p>
-            <a:pPr marL="457200" indent="-457200">
-              <a:buFont typeface="Wingdings" charset="2"/>
-              <a:buChar char="§"/>
-            </a:pPr>
-            <a:r>
-              <a:rPr lang="en-US" sz="2800" dirty="0" smtClean="0"/>
-              <a:t>Visualization of results and manipulating graphs</a:t>
-            </a:r>
-            <a:endParaRPr lang="en-US" sz="2800" dirty="0"/>
-          </a:p>
-        </p:txBody>
-      </p:sp>
     </p:spTree>
     <p:extLst>
       <p:ext uri="{BB962C8B-B14F-4D97-AF65-F5344CB8AC3E}">
-        <p14:creationId xmlns:p14="http://schemas.microsoft.com/office/powerpoint/2010/main" val="2033679312"/>
+        <p14:creationId xmlns:p14="http://schemas.microsoft.com/office/powerpoint/2010/main" val="555642007"/>
       </p:ext>
     </p:extLst>
   </p:cSld>
@@ -5498,117 +5416,11 @@
           <a:p>
             <a:r>
               <a:rPr lang="en-US" dirty="0" smtClean="0"/>
-              <a:t>Conclusion</a:t>
-            </a:r>
-            <a:endParaRPr lang="en-US" dirty="0"/>
-          </a:p>
-        </p:txBody>
-      </p:sp>
-      <p:sp>
-        <p:nvSpPr>
-          <p:cNvPr id="3" name="Content Placeholder 2"/>
-          <p:cNvSpPr>
-            <a:spLocks noGrp="1"/>
-          </p:cNvSpPr>
-          <p:nvPr>
-            <p:ph idx="1"/>
-          </p:nvPr>
-        </p:nvSpPr>
-        <p:spPr>
-          <a:xfrm>
-            <a:off x="457199" y="1752600"/>
-            <a:ext cx="8245475" cy="4373563"/>
-          </a:xfrm>
-        </p:spPr>
-        <p:txBody>
-          <a:bodyPr>
-            <a:normAutofit/>
-          </a:bodyPr>
-          <a:lstStyle/>
-          <a:p>
-            <a:endParaRPr lang="en-US" sz="2800" b="0" dirty="0"/>
-          </a:p>
-        </p:txBody>
-      </p:sp>
-      <p:sp>
-        <p:nvSpPr>
-          <p:cNvPr id="5" name="Slide Number Placeholder 4"/>
-          <p:cNvSpPr>
-            <a:spLocks noGrp="1"/>
-          </p:cNvSpPr>
-          <p:nvPr>
-            <p:ph type="sldNum" sz="quarter" idx="12"/>
-          </p:nvPr>
-        </p:nvSpPr>
-        <p:spPr/>
-        <p:txBody>
-          <a:bodyPr/>
-          <a:lstStyle/>
-          <a:p>
-            <a:fld id="{F38DF745-7D3F-47F4-83A3-874385CFAA69}" type="slidenum">
-              <a:rPr lang="en-US" smtClean="0"/>
-              <a:pPr/>
-              <a:t>12</a:t>
-            </a:fld>
-            <a:endParaRPr lang="en-US"/>
-          </a:p>
-        </p:txBody>
-      </p:sp>
-    </p:spTree>
-    <p:extLst>
-      <p:ext uri="{BB962C8B-B14F-4D97-AF65-F5344CB8AC3E}">
-        <p14:creationId xmlns:p14="http://schemas.microsoft.com/office/powerpoint/2010/main" val="555642007"/>
-      </p:ext>
-    </p:extLst>
-  </p:cSld>
-  <p:clrMapOvr>
-    <a:masterClrMapping/>
-  </p:clrMapOvr>
-  <p:timing>
-    <p:tnLst>
-      <p:par>
-        <p:cTn xmlns:p14="http://schemas.microsoft.com/office/powerpoint/2010/main" id="1" dur="indefinite" restart="never" nodeType="tmRoot"/>
-      </p:par>
-    </p:tnLst>
-  </p:timing>
-</p:sld>
-</file>
-
-<file path=ppt/slides/slide13.xml><?xml version="1.0" encoding="utf-8"?>
-<p:sld xmlns:a="http://schemas.openxmlformats.org/drawingml/2006/main" xmlns:r="http://schemas.openxmlformats.org/officeDocument/2006/relationships" xmlns:p="http://schemas.openxmlformats.org/presentationml/2006/main">
-  <p:cSld>
-    <p:spTree>
-      <p:nvGrpSpPr>
-        <p:cNvPr id="1" name=""/>
-        <p:cNvGrpSpPr/>
-        <p:nvPr/>
-      </p:nvGrpSpPr>
-      <p:grpSpPr>
-        <a:xfrm>
-          <a:off x="0" y="0"/>
-          <a:ext cx="0" cy="0"/>
-          <a:chOff x="0" y="0"/>
-          <a:chExt cx="0" cy="0"/>
-        </a:xfrm>
-      </p:grpSpPr>
-      <p:sp>
-        <p:nvSpPr>
-          <p:cNvPr id="2" name="Title 1"/>
-          <p:cNvSpPr>
-            <a:spLocks noGrp="1"/>
-          </p:cNvSpPr>
-          <p:nvPr>
-            <p:ph type="title"/>
-          </p:nvPr>
-        </p:nvSpPr>
-        <p:spPr/>
-        <p:txBody>
-          <a:bodyPr/>
-          <a:lstStyle/>
-          <a:p>
+              <a:t>Current </a:t>
+            </a:r>
             <a:r>
               <a:rPr lang="en-US" dirty="0" smtClean="0"/>
-              <a:t>Future work</a:t>
+              <a:t>work</a:t>
             </a:r>
             <a:endParaRPr lang="en-US" dirty="0"/>
           </a:p>
@@ -5672,7 +5484,15 @@
             </a:r>
             <a:r>
               <a:rPr lang="en-US" sz="2800" b="0" dirty="0" smtClean="0"/>
-              <a:t> Analyzer  to PGAS using the Parallel IR of </a:t>
+              <a:t> </a:t>
+            </a:r>
+            <a:r>
+              <a:rPr lang="en-US" sz="2800" b="0" dirty="0" smtClean="0"/>
+              <a:t>Analyzer </a:t>
+            </a:r>
+            <a:r>
+              <a:rPr lang="en-US" sz="2800" b="0" dirty="0" smtClean="0"/>
+              <a:t>to PGAS using the Parallel IR of </a:t>
             </a:r>
             <a:r>
               <a:rPr lang="en-US" sz="2800" b="0" dirty="0" err="1" smtClean="0"/>
@@ -5723,7 +5543,7 @@
             <a:fld id="{F38DF745-7D3F-47F4-83A3-874385CFAA69}" type="slidenum">
               <a:rPr lang="en-US" smtClean="0"/>
               <a:pPr/>
-              <a:t>13</a:t>
+              <a:t>12</a:t>
             </a:fld>
             <a:endParaRPr lang="en-US"/>
           </a:p>
@@ -6042,7 +5862,7 @@
               <a:rPr lang="en-US" sz="3200" b="0" dirty="0" smtClean="0">
                 <a:cs typeface="Times New Roman"/>
               </a:rPr>
-              <a:t>Introduction</a:t>
+              <a:t>Motivation</a:t>
             </a:r>
           </a:p>
           <a:p>
@@ -6054,8 +5874,11 @@
               <a:rPr lang="en-US" sz="3200" b="0" dirty="0" smtClean="0">
                 <a:cs typeface="Times New Roman"/>
               </a:rPr>
-              <a:t>Motivation</a:t>
-            </a:r>
+              <a:t>Features</a:t>
+            </a:r>
+            <a:endParaRPr lang="en-US" sz="3200" b="0" dirty="0" smtClean="0">
+              <a:cs typeface="Times New Roman"/>
+            </a:endParaRPr>
           </a:p>
           <a:p>
             <a:pPr marL="457200" indent="-457200">
@@ -6132,7 +5955,19 @@
               <a:rPr lang="en-US" sz="3200" b="0" dirty="0" smtClean="0">
                 <a:cs typeface="Times New Roman"/>
               </a:rPr>
-              <a:t>Future Work </a:t>
+              <a:t>Current</a:t>
+            </a:r>
+            <a:r>
+              <a:rPr lang="en-US" sz="3200" b="0" dirty="0" smtClean="0">
+                <a:cs typeface="Times New Roman"/>
+              </a:rPr>
+              <a:t> </a:t>
+            </a:r>
+            <a:r>
+              <a:rPr lang="en-US" sz="3200" b="0" dirty="0" smtClean="0">
+                <a:cs typeface="Times New Roman"/>
+              </a:rPr>
+              <a:t>Work </a:t>
             </a:r>
             <a:endParaRPr lang="en-US" sz="3200" b="0" dirty="0">
               <a:cs typeface="Times New Roman"/>
@@ -6218,7 +6053,7 @@
           <a:p>
             <a:r>
               <a:rPr lang="en-US" dirty="0" smtClean="0"/>
-              <a:t>Introduction</a:t>
+              <a:t>Motivation</a:t>
             </a:r>
             <a:endParaRPr lang="en-US" dirty="0"/>
           </a:p>
@@ -6254,8 +6089,85 @@
               <a:rPr lang="en-US" sz="3200" b="0" dirty="0" smtClean="0">
                 <a:cs typeface="Times New Roman"/>
               </a:rPr>
-              <a:t>PGAS memory model</a:t>
-            </a:r>
+              <a:t>Library vs. Language</a:t>
+            </a:r>
+          </a:p>
+          <a:p>
+            <a:pPr marL="457200" indent="-457200">
+              <a:buFont typeface="Wingdings" charset="2"/>
+              <a:buChar char="§"/>
+            </a:pPr>
+            <a:r>
+              <a:rPr lang="en-US" sz="3200" b="0" dirty="0" smtClean="0">
+                <a:cs typeface="Times New Roman"/>
+              </a:rPr>
+              <a:t>Common errors</a:t>
+            </a:r>
+          </a:p>
+          <a:p>
+            <a:pPr marL="914400" lvl="1" indent="-457200">
+              <a:buFont typeface="Wingdings" charset="2"/>
+              <a:buChar char="§"/>
+            </a:pPr>
+            <a:r>
+              <a:rPr lang="en-US" sz="3200" b="0" dirty="0" smtClean="0">
+                <a:cs typeface="Times New Roman"/>
+              </a:rPr>
+              <a:t>Porting existing codes to </a:t>
+            </a:r>
+            <a:r>
+              <a:rPr lang="en-US" sz="3200" b="0" dirty="0" err="1" smtClean="0">
+                <a:cs typeface="Times New Roman"/>
+              </a:rPr>
+              <a:t>OpenSHMEM</a:t>
+            </a:r>
+            <a:endParaRPr lang="en-US" sz="3200" b="0" dirty="0" smtClean="0">
+              <a:cs typeface="Times New Roman"/>
+            </a:endParaRPr>
+          </a:p>
+          <a:p>
+            <a:pPr marL="457200" indent="-457200">
+              <a:buFont typeface="Wingdings" charset="2"/>
+              <a:buChar char="§"/>
+            </a:pPr>
+            <a:r>
+              <a:rPr lang="en-US" sz="3200" b="0" dirty="0" smtClean="0">
+                <a:cs typeface="Times New Roman"/>
+              </a:rPr>
+              <a:t>Necessity of compile-time approach for large scale executions</a:t>
+            </a:r>
+          </a:p>
+          <a:p>
+            <a:pPr marL="457200" indent="-457200">
+              <a:buFont typeface="Wingdings" charset="2"/>
+              <a:buChar char="§"/>
+            </a:pPr>
+            <a:r>
+              <a:rPr lang="en-US" sz="3200" b="0" dirty="0"/>
+              <a:t>Implementation of </a:t>
+            </a:r>
+            <a:r>
+              <a:rPr lang="en-US" sz="3200" b="0" dirty="0" err="1"/>
+              <a:t>OpenSHMEM</a:t>
+            </a:r>
+            <a:r>
+              <a:rPr lang="en-US" sz="3200" b="0" dirty="0"/>
+              <a:t>-aware compiler within </a:t>
+            </a:r>
+            <a:r>
+              <a:rPr lang="en-US" sz="3200" b="0" dirty="0" err="1"/>
+              <a:t>OpenUH</a:t>
+            </a:r>
+            <a:endParaRPr lang="en-US" sz="3200" b="0" dirty="0"/>
+          </a:p>
+          <a:p>
+            <a:pPr marL="457200" indent="-457200">
+              <a:buFont typeface="Wingdings" charset="2"/>
+              <a:buChar char="§"/>
+            </a:pPr>
+            <a:endParaRPr lang="en-US" sz="3200" b="0" dirty="0" smtClean="0">
+              <a:cs typeface="Times New Roman"/>
+            </a:endParaRPr>
           </a:p>
           <a:p>
             <a:pPr marL="457200" indent="-457200">
@@ -6351,7 +6263,7 @@
           <a:p>
             <a:r>
               <a:rPr lang="en-US" dirty="0" smtClean="0"/>
-              <a:t>Motivation</a:t>
+              <a:t>Features</a:t>
             </a:r>
             <a:endParaRPr lang="en-US" dirty="0"/>
           </a:p>
@@ -6365,7 +6277,7 @@
         </p:nvSpPr>
         <p:spPr>
           <a:xfrm>
-            <a:off x="-3177" y="1771532"/>
+            <a:off x="-3177" y="1708032"/>
             <a:ext cx="8401051" cy="3180358"/>
           </a:xfrm>
           <a:prstGeom prst="rect">
@@ -6386,16 +6298,16 @@
               <a:buChar char="§"/>
             </a:pPr>
             <a:r>
+              <a:rPr lang="en-US" sz="2800" dirty="0"/>
+              <a:t>Supported input languages: </a:t>
+            </a:r>
+            <a:r>
               <a:rPr lang="en-US" sz="2800" dirty="0" smtClean="0"/>
-              <a:t>Source </a:t>
+              <a:t>C and C</a:t>
             </a:r>
             <a:r>
               <a:rPr lang="en-US" sz="2800" dirty="0"/>
-              <a:t>code analysis and correctness checks capabilities to the </a:t>
-            </a:r>
-            <a:r>
-              <a:rPr lang="en-US" sz="2800" dirty="0" smtClean="0"/>
-              <a:t>user</a:t>
+              <a:t>++</a:t>
             </a:r>
           </a:p>
           <a:p>
@@ -6408,15 +6320,11 @@
             </a:pPr>
             <a:r>
               <a:rPr lang="en-US" sz="2800" dirty="0" smtClean="0"/>
-              <a:t>A </a:t>
+              <a:t>Source </a:t>
             </a:r>
             <a:r>
               <a:rPr lang="en-US" sz="2800" dirty="0"/>
-              <a:t>range of information about the source program in textual or graphical </a:t>
-            </a:r>
-            <a:r>
-              <a:rPr lang="en-US" sz="2800" dirty="0" smtClean="0"/>
-              <a:t>format</a:t>
+              <a:t>code analysis and correctness checking capabilities</a:t>
             </a:r>
           </a:p>
           <a:p>
@@ -6429,25 +6337,34 @@
             </a:pPr>
             <a:r>
               <a:rPr lang="en-US" sz="2800" dirty="0" smtClean="0"/>
-              <a:t>Errors and </a:t>
+              <a:t>Graphical </a:t>
+            </a:r>
+            <a:r>
+              <a:rPr lang="en-US" sz="2800" dirty="0" smtClean="0"/>
+              <a:t>and textual display of </a:t>
+            </a:r>
+            <a:r>
+              <a:rPr lang="en-US" sz="2800" dirty="0" smtClean="0"/>
+              <a:t>analyses for the source program</a:t>
+            </a:r>
+            <a:endParaRPr lang="en-US" sz="2800" dirty="0" smtClean="0"/>
+          </a:p>
+          <a:p>
+            <a:pPr marL="457200" indent="-457200">
+              <a:lnSpc>
+                <a:spcPct val="120000"/>
+              </a:lnSpc>
+              <a:buFont typeface="Wingdings" charset="2"/>
+              <a:buChar char="§"/>
+            </a:pPr>
+            <a:r>
+              <a:rPr lang="en-US" sz="2800" dirty="0" smtClean="0"/>
+              <a:t>Intra</a:t>
             </a:r>
             <a:r>
               <a:rPr lang="en-US" sz="2800" dirty="0"/>
-              <a:t>inefficiencies</a:t>
-            </a:r>
-            <a:r>
-              <a:rPr lang="en-US" sz="2800" dirty="0" smtClean="0"/>
-              <a:t> detection in </a:t>
-            </a:r>
-            <a:r>
-              <a:rPr lang="en-US" sz="2800" dirty="0" err="1" smtClean="0"/>
-              <a:t>OpenSHMEM</a:t>
-            </a:r>
-            <a:r>
-              <a:rPr lang="en-US" sz="2800" dirty="0" smtClean="0"/>
-              <a:t> programs</a:t>
-            </a:r>
-            <a:endParaRPr lang="en-US" sz="2800" dirty="0"/>
+              <a:t>-and Inter-procedural analysis </a:t>
+            </a:r>
           </a:p>
         </p:txBody>
       </p:sp>
@@ -6478,7 +6395,7 @@
     </p:spTree>
     <p:extLst>
       <p:ext uri="{BB962C8B-B14F-4D97-AF65-F5344CB8AC3E}">
-        <p14:creationId xmlns:p14="http://schemas.microsoft.com/office/powerpoint/2010/main" val="1238057339"/>
+        <p14:creationId xmlns:p14="http://schemas.microsoft.com/office/powerpoint/2010/main" val="1423460642"/>
       </p:ext>
     </p:extLst>
   </p:cSld>
@@ -6528,8 +6445,12 @@
           <a:lstStyle/>
           <a:p>
             <a:r>
+              <a:rPr lang="en-US" dirty="0" err="1" smtClean="0"/>
+              <a:t>OpenUH</a:t>
+            </a:r>
+            <a:r>
               <a:rPr lang="en-US" dirty="0" smtClean="0"/>
-              <a:t>Features</a:t>
+              <a:t> compiler</a:t>
             </a:r>
             <a:endParaRPr lang="en-US" dirty="0"/>
           </a:p>
@@ -6537,141 +6458,140 @@
       </p:sp>
       <p:sp>
         <p:nvSpPr>
-          <p:cNvPr id="6" name="Rectangle 5"/>
-          <p:cNvSpPr/>
+          <p:cNvPr id="9" name="Slide Number Placeholder 8"/>
+          <p:cNvSpPr>
+            <a:spLocks noGrp="1"/>
+          </p:cNvSpPr>
+          <p:nvPr>
+            <p:ph type="sldNum" sz="quarter" idx="12"/>
+          </p:nvPr>
+        </p:nvSpPr>
+        <p:spPr/>
+        <p:txBody>
+          <a:bodyPr/>
+          <a:lstStyle/>
+          <a:p>
+            <a:fld id="{F38DF745-7D3F-47F4-83A3-874385CFAA69}" type="slidenum">
+              <a:rPr lang="en-US" smtClean="0"/>
+              <a:pPr/>
+              <a:t>6</a:t>
+            </a:fld>
+            <a:endParaRPr lang="en-US" dirty="0"/>
+          </a:p>
+        </p:txBody>
+      </p:sp>
+      <p:sp>
+        <p:nvSpPr>
+          <p:cNvPr id="3" name="TextBox 2"/>
+          <p:cNvSpPr txBox="1"/>
           <p:nvPr/>
         </p:nvSpPr>
         <p:spPr>
           <a:xfrm>
-            <a:off x="-3177" y="1771532"/>
-            <a:ext cx="8401051" cy="3180358"/>
+            <a:off x="2254250" y="2905125"/>
+            <a:ext cx="184666" cy="369332"/>
           </a:xfrm>
           <a:prstGeom prst="rect">
             <a:avLst/>
           </a:prstGeom>
+          <a:noFill/>
         </p:spPr>
         <p:txBody>
-          <a:bodyPr wrap="square">
+          <a:bodyPr wrap="none" rtlCol="0">
             <a:spAutoFit/>
           </a:bodyPr>
           <a:lstStyle/>
           <a:p>
-            <a:pPr marL="457200" indent="-457200">
-              <a:lnSpc>
-                <a:spcPct val="120000"/>
-              </a:lnSpc>
+            <a:endParaRPr lang="en-US" dirty="0"/>
+          </a:p>
+        </p:txBody>
+      </p:sp>
+      <p:sp>
+        <p:nvSpPr>
+          <p:cNvPr id="7" name="Content Placeholder 2"/>
+          <p:cNvSpPr>
+            <a:spLocks noGrp="1"/>
+          </p:cNvSpPr>
+          <p:nvPr>
+            <p:ph idx="1"/>
+          </p:nvPr>
+        </p:nvSpPr>
+        <p:spPr>
+          <a:xfrm>
+            <a:off x="154669" y="1932398"/>
+            <a:ext cx="8229600" cy="4533900"/>
+          </a:xfrm>
+        </p:spPr>
+        <p:txBody>
+          <a:bodyPr>
+            <a:normAutofit/>
+          </a:bodyPr>
+          <a:lstStyle/>
+          <a:p>
+            <a:pPr marL="285750" indent="-285750">
               <a:buFont typeface="Wingdings" charset="2"/>
               <a:buChar char="§"/>
             </a:pPr>
             <a:r>
-              <a:rPr lang="en-US" sz="2800" dirty="0" smtClean="0"/>
-              <a:t>Implementation </a:t>
-            </a:r>
-            <a:r>
-              <a:rPr lang="en-US" sz="2800" dirty="0"/>
-              <a:t>of </a:t>
-            </a:r>
-            <a:r>
-              <a:rPr lang="en-US" sz="2800" dirty="0" err="1"/>
-              <a:t>OpenSHMEM</a:t>
-            </a:r>
-            <a:r>
-              <a:rPr lang="en-US" sz="2800" dirty="0"/>
-              <a:t>-aware compiler within </a:t>
-            </a:r>
-            <a:r>
-              <a:rPr lang="en-US" sz="2800" dirty="0" err="1" smtClean="0"/>
-              <a:t>OpenUH</a:t>
-            </a:r>
-            <a:endParaRPr lang="en-US" sz="2800" dirty="0"/>
-          </a:p>
-          <a:p>
-            <a:pPr marL="457200" indent="-457200">
-              <a:lnSpc>
-                <a:spcPct val="120000"/>
-              </a:lnSpc>
+              <a:rPr lang="en-US" sz="2800" b="0" dirty="0"/>
+              <a:t>Open64-</a:t>
+            </a:r>
+            <a:r>
+              <a:rPr lang="en-US" sz="2800" b="0" dirty="0" smtClean="0"/>
+              <a:t>based compiler</a:t>
+            </a:r>
+          </a:p>
+          <a:p>
+            <a:pPr marL="285750" indent="-285750">
               <a:buFont typeface="Wingdings" charset="2"/>
               <a:buChar char="§"/>
             </a:pPr>
             <a:r>
-              <a:rPr lang="en-US" sz="2800" dirty="0" smtClean="0"/>
-              <a:t>Intra</a:t>
-            </a:r>
-            <a:r>
-              <a:rPr lang="en-US" sz="2800" dirty="0"/>
-              <a:t>-and Inter-procedural analysis (-IPA) </a:t>
-            </a:r>
-            <a:endParaRPr lang="en-US" sz="2800" dirty="0" smtClean="0"/>
-          </a:p>
-          <a:p>
-            <a:pPr marL="457200" indent="-457200">
-              <a:lnSpc>
-                <a:spcPct val="120000"/>
-              </a:lnSpc>
+              <a:rPr lang="en-US" sz="2800" b="0" dirty="0" smtClean="0"/>
+              <a:t>Sophisticated intra</a:t>
+            </a:r>
+            <a:r>
+              <a:rPr lang="en-US" sz="2800" b="0" dirty="0" smtClean="0"/>
+              <a:t>- and inter-procedural analyses and optimizations</a:t>
+            </a:r>
+          </a:p>
+          <a:p>
+            <a:pPr marL="285750" indent="-285750">
               <a:buFont typeface="Wingdings" charset="2"/>
               <a:buChar char="§"/>
             </a:pPr>
             <a:r>
-              <a:rPr lang="en-US" sz="2800" dirty="0" smtClean="0"/>
-              <a:t>Graphical and textual display of analyses</a:t>
-            </a:r>
-          </a:p>
-          <a:p>
-            <a:pPr marL="457200" indent="-457200">
-              <a:lnSpc>
-                <a:spcPct val="120000"/>
-              </a:lnSpc>
-              <a:buFont typeface="Wingdings" charset="2"/>
-              <a:buChar char="§"/>
-            </a:pPr>
-            <a:r>
-              <a:rPr lang="en-US" sz="2800" dirty="0"/>
-              <a:t>Supported input languages: C/C++</a:t>
-            </a:r>
-            <a:endParaRPr lang="en-US" sz="2800" dirty="0"/>
-          </a:p>
-          <a:p>
-            <a:pPr marL="457200" indent="-457200">
-              <a:lnSpc>
-                <a:spcPct val="120000"/>
-              </a:lnSpc>
-              <a:buFont typeface="Wingdings" charset="2"/>
-              <a:buChar char="§"/>
-            </a:pPr>
-            <a:endParaRPr lang="en-US" sz="2800" dirty="0">
-              <a:cs typeface="Times New Roman"/>
-            </a:endParaRPr>
-          </a:p>
-        </p:txBody>
-      </p:sp>
-      <p:sp>
-        <p:nvSpPr>
-          <p:cNvPr id="9" name="Slide Number Placeholder 8"/>
-          <p:cNvSpPr>
-            <a:spLocks noGrp="1"/>
-          </p:cNvSpPr>
-          <p:nvPr>
-            <p:ph type="sldNum" sz="quarter" idx="12"/>
-          </p:nvPr>
-        </p:nvSpPr>
-        <p:spPr/>
-        <p:txBody>
-          <a:bodyPr/>
-          <a:lstStyle/>
-          <a:p>
-            <a:fld id="{F38DF745-7D3F-47F4-83A3-874385CFAA69}" type="slidenum">
-              <a:rPr lang="en-US" smtClean="0"/>
-              <a:pPr/>
-              <a:t>6</a:t>
-            </a:fld>
-            <a:endParaRPr lang="en-US" dirty="0"/>
+              <a:rPr lang="en-US" sz="2800" b="0" dirty="0" smtClean="0"/>
+              <a:t>Existing support for parallel models: </a:t>
+            </a:r>
+            <a:r>
+              <a:rPr lang="en-US" sz="2800" b="0" dirty="0" err="1" smtClean="0"/>
+              <a:t>OpenMP</a:t>
+            </a:r>
+            <a:r>
+              <a:rPr lang="en-US" sz="2800" b="0" dirty="0" smtClean="0"/>
+              <a:t>, </a:t>
+            </a:r>
+            <a:r>
+              <a:rPr lang="en-US" sz="2800" b="0" dirty="0" err="1" smtClean="0"/>
+              <a:t>OpenACC</a:t>
+            </a:r>
+            <a:r>
+              <a:rPr lang="en-US" sz="2800" b="0" dirty="0" smtClean="0"/>
+              <a:t> and</a:t>
+            </a:r>
+            <a:r>
+              <a:rPr lang="en-US" sz="2800" b="0" dirty="0" smtClean="0"/>
+              <a:t> CAF</a:t>
+            </a:r>
+            <a:endParaRPr lang="en-US" sz="2800" dirty="0" smtClean="0"/>
           </a:p>
         </p:txBody>
       </p:sp>
     </p:spTree>
     <p:extLst>
       <p:ext uri="{BB962C8B-B14F-4D97-AF65-F5344CB8AC3E}">
-        <p14:creationId xmlns:p14="http://schemas.microsoft.com/office/powerpoint/2010/main" val="1423460642"/>
+        <p14:creationId xmlns:p14="http://schemas.microsoft.com/office/powerpoint/2010/main" val="2689653601"/>
       </p:ext>
     </p:extLst>
   </p:cSld>
@@ -6707,150 +6627,6 @@
       </p:grpSpPr>
       <p:sp>
         <p:nvSpPr>
-          <p:cNvPr id="2" name="Title 1"/>
-          <p:cNvSpPr>
-            <a:spLocks noGrp="1"/>
-          </p:cNvSpPr>
-          <p:nvPr>
-            <p:ph type="title"/>
-          </p:nvPr>
-        </p:nvSpPr>
-        <p:spPr/>
-        <p:txBody>
-          <a:bodyPr/>
-          <a:lstStyle/>
-          <a:p>
-            <a:r>
-              <a:rPr lang="en-US" dirty="0" err="1" smtClean="0"/>
-              <a:t>OpenUH</a:t>
-            </a:r>
-            <a:r>
-              <a:rPr lang="en-US" dirty="0" smtClean="0"/>
-              <a:t> compiler</a:t>
-            </a:r>
-            <a:endParaRPr lang="en-US" dirty="0"/>
-          </a:p>
-        </p:txBody>
-      </p:sp>
-      <p:sp>
-        <p:nvSpPr>
-          <p:cNvPr id="9" name="Slide Number Placeholder 8"/>
-          <p:cNvSpPr>
-            <a:spLocks noGrp="1"/>
-          </p:cNvSpPr>
-          <p:nvPr>
-            <p:ph type="sldNum" sz="quarter" idx="12"/>
-          </p:nvPr>
-        </p:nvSpPr>
-        <p:spPr/>
-        <p:txBody>
-          <a:bodyPr/>
-          <a:lstStyle/>
-          <a:p>
-            <a:fld id="{F38DF745-7D3F-47F4-83A3-874385CFAA69}" type="slidenum">
-              <a:rPr lang="en-US" smtClean="0"/>
-              <a:pPr/>
-              <a:t>7</a:t>
-            </a:fld>
-            <a:endParaRPr lang="en-US" dirty="0"/>
-          </a:p>
-        </p:txBody>
-      </p:sp>
-      <p:sp>
-        <p:nvSpPr>
-          <p:cNvPr id="3" name="TextBox 2"/>
-          <p:cNvSpPr txBox="1"/>
-          <p:nvPr/>
-        </p:nvSpPr>
-        <p:spPr>
-          <a:xfrm>
-            <a:off x="2254250" y="2905125"/>
-            <a:ext cx="184666" cy="369332"/>
-          </a:xfrm>
-          <a:prstGeom prst="rect">
-            <a:avLst/>
-          </a:prstGeom>
-          <a:noFill/>
-        </p:spPr>
-        <p:txBody>
-          <a:bodyPr wrap="none" rtlCol="0">
-            <a:spAutoFit/>
-          </a:bodyPr>
-          <a:lstStyle/>
-          <a:p>
-            <a:endParaRPr lang="en-US" dirty="0"/>
-          </a:p>
-        </p:txBody>
-      </p:sp>
-      <p:sp>
-        <p:nvSpPr>
-          <p:cNvPr id="7" name="Content Placeholder 2"/>
-          <p:cNvSpPr>
-            <a:spLocks noGrp="1"/>
-          </p:cNvSpPr>
-          <p:nvPr>
-            <p:ph idx="1"/>
-          </p:nvPr>
-        </p:nvSpPr>
-        <p:spPr>
-          <a:xfrm>
-            <a:off x="154669" y="1932398"/>
-            <a:ext cx="8229600" cy="4533900"/>
-          </a:xfrm>
-        </p:spPr>
-        <p:txBody>
-          <a:bodyPr>
-            <a:normAutofit/>
-          </a:bodyPr>
-          <a:lstStyle/>
-          <a:p>
-            <a:pPr marL="285750" indent="-285750">
-              <a:buFont typeface="Wingdings" charset="2"/>
-              <a:buChar char="§"/>
-            </a:pPr>
-            <a:endParaRPr lang="en-US" sz="1400" dirty="0" smtClean="0"/>
-          </a:p>
-        </p:txBody>
-      </p:sp>
-    </p:spTree>
-    <p:extLst>
-      <p:ext uri="{BB962C8B-B14F-4D97-AF65-F5344CB8AC3E}">
-        <p14:creationId xmlns:p14="http://schemas.microsoft.com/office/powerpoint/2010/main" val="2689653601"/>
-      </p:ext>
-    </p:extLst>
-  </p:cSld>
-  <p:clrMapOvr>
-    <a:masterClrMapping/>
-  </p:clrMapOvr>
-  <p:timing>
-    <p:tnLst>
-      <p:par>
-        <p:cTn xmlns:p14="http://schemas.microsoft.com/office/powerpoint/2010/main" id="1" dur="indefinite" restart="never" nodeType="tmRoot"/>
-      </p:par>
-    </p:tnLst>
-  </p:timing>
-</p:sld>
-</file>
-
-<file path=ppt/slides/slide8.xml><?xml version="1.0" encoding="utf-8"?>
-<p:sld xmlns:a="http://schemas.openxmlformats.org/drawingml/2006/main" xmlns:r="http://schemas.openxmlformats.org/officeDocument/2006/relationships" xmlns:p="http://schemas.openxmlformats.org/presentationml/2006/main">
-  <p:cSld>
-    <p:spTree>
-      <p:nvGrpSpPr>
-        <p:cNvPr id="1" name=""/>
-        <p:cNvGrpSpPr/>
-        <p:nvPr/>
-      </p:nvGrpSpPr>
-      <p:grpSpPr>
-        <a:xfrm>
-          <a:off x="0" y="0"/>
-          <a:ext cx="0" cy="0"/>
-          <a:chOff x="0" y="0"/>
-          <a:chExt cx="0" cy="0"/>
-        </a:xfrm>
-      </p:grpSpPr>
-      <p:sp>
-        <p:nvSpPr>
           <p:cNvPr id="9" name="Slide Number Placeholder 8"/>
           <p:cNvSpPr>
             <a:spLocks noGrp="1"/>
@@ -6861,7 +6637,7 @@
         </p:nvSpPr>
         <p:spPr>
           <a:xfrm rot="16200000">
-            <a:off x="7925361" y="5885497"/>
+            <a:off x="8131736" y="5980747"/>
             <a:ext cx="1315721" cy="365125"/>
           </a:xfrm>
         </p:spPr>
@@ -6873,7 +6649,7 @@
             <a:fld id="{F38DF745-7D3F-47F4-83A3-874385CFAA69}" type="slidenum">
               <a:rPr lang="en-US" smtClean="0"/>
               <a:pPr algn="ctr"/>
-              <a:t>8</a:t>
+              <a:t>7</a:t>
             </a:fld>
             <a:endParaRPr lang="en-US" dirty="0"/>
           </a:p>
@@ -7020,18 +6796,31 @@
             <a:pPr algn="ctr"/>
             <a:r>
               <a:rPr lang="en-US" dirty="0" smtClean="0"/>
-              <a:t>Linkage </a:t>
-            </a:r>
+              <a:t>Linker (</a:t>
+            </a:r>
+            <a:r>
+              <a:rPr lang="en-US" dirty="0" err="1" smtClean="0"/>
+              <a:t>interprocedural</a:t>
+            </a:r>
+            <a:r>
+              <a:rPr lang="en-US" dirty="0" smtClean="0"/>
+              <a:t>)</a:t>
+            </a:r>
+            <a:endParaRPr lang="en-US" dirty="0" smtClean="0"/>
           </a:p>
           <a:p>
             <a:pPr algn="ctr"/>
             <a:r>
+              <a:rPr lang="en-US" dirty="0" err="1"/>
+              <a:t>u</a:t>
+            </a:r>
+            <a:r>
               <a:rPr lang="en-US" dirty="0" err="1" smtClean="0"/>
-              <a:t>uhcc</a:t>
+              <a:t>hcc</a:t>
             </a:r>
             <a:r>
               <a:rPr lang="en-US" dirty="0" smtClean="0"/>
-              <a:t> -</a:t>
+              <a:t> –</a:t>
             </a:r>
             <a:r>
               <a:rPr lang="en-US" dirty="0" err="1" smtClean="0"/>
@@ -7039,15 +6828,15 @@
             </a:r>
             <a:r>
               <a:rPr lang="en-US" dirty="0" smtClean="0"/>
-              <a:t>-</a:t>
+              <a:t>-analyzer </a:t>
             </a:r>
             <a:r>
               <a:rPr lang="en-US" dirty="0" smtClean="0"/>
-              <a:t>analyzer </a:t>
+              <a:t>*</a:t>
             </a:r>
             <a:r>
               <a:rPr lang="en-US" dirty="0" smtClean="0"/>
-              <a:t>*.-o </a:t>
+              <a:t>.-o </a:t>
             </a:r>
             <a:endParaRPr lang="en-US" dirty="0"/>
           </a:p>
@@ -7062,13 +6851,13 @@
           <p:nvPr>
             <p:extLst>
               <p:ext uri="{D42A27DB-BD31-4B8C-83A1-F6EECF244321}">
-                <p14:modId xmlns:p14="http://schemas.microsoft.com/office/powerpoint/2010/main" val="4251318709"/>
+                <p14:modId xmlns:p14="http://schemas.microsoft.com/office/powerpoint/2010/main" val="1833121182"/>
               </p:ext>
             </p:extLst>
           </p:nvPr>
         </p:nvGraphicFramePr>
         <p:xfrm>
-          <a:off x="2885217" y="3450550"/>
+          <a:off x="5250592" y="3414167"/>
           <a:ext cx="3332630" cy="1854200"/>
         </p:xfrm>
         <a:graphic>
@@ -7157,7 +6946,11 @@
                     <a:p>
                       <a:r>
                         <a:rPr lang="en-US" dirty="0" smtClean="0"/>
-                        <a:t>Variable Initialization Checking</a:t>
+                        <a:t>Pointer </a:t>
+                      </a:r>
+                      <a:r>
+                        <a:rPr lang="en-US" dirty="0" smtClean="0"/>
+                        <a:t>Initialization Checking</a:t>
                       </a:r>
                       <a:endParaRPr lang="en-US" dirty="0"/>
                     </a:p>
@@ -7295,7 +7088,7 @@
         </p:nvSpPr>
         <p:spPr>
           <a:xfrm>
-            <a:off x="4462548" y="3057905"/>
+            <a:off x="5796048" y="3057905"/>
             <a:ext cx="216838" cy="356262"/>
           </a:xfrm>
           <a:prstGeom prst="downArrow">
@@ -7333,7 +7126,7 @@
         </p:nvSpPr>
         <p:spPr>
           <a:xfrm>
-            <a:off x="4413589" y="5334935"/>
+            <a:off x="5858214" y="5319060"/>
             <a:ext cx="216838" cy="356262"/>
           </a:xfrm>
           <a:prstGeom prst="downArrow">
@@ -7363,6 +7156,36 @@
           </a:p>
         </p:txBody>
       </p:sp>
+      <p:pic>
+        <p:nvPicPr>
+          <p:cNvPr id="4" name="Picture 3" descr="test-bounds.gif"/>
+          <p:cNvPicPr>
+            <a:picLocks noChangeAspect="1"/>
+          </p:cNvPicPr>
+          <p:nvPr/>
+        </p:nvPicPr>
+        <p:blipFill>
+          <a:blip r:embed="rId3">
+            <a:extLst>
+              <a:ext uri="{28A0092B-C50C-407E-A947-70E740481C1C}">
+                <a14:useLocalDpi xmlns:a14="http://schemas.microsoft.com/office/drawing/2010/main" val="0"/>
+              </a:ext>
+            </a:extLst>
+          </a:blip>
+          <a:stretch>
+            <a:fillRect/>
+          </a:stretch>
+        </p:blipFill>
+        <p:spPr>
+          <a:xfrm>
+            <a:off x="0" y="3057906"/>
+            <a:ext cx="5250592" cy="2617416"/>
+          </a:xfrm>
+          <a:prstGeom prst="rect">
+            <a:avLst/>
+          </a:prstGeom>
+        </p:spPr>
+      </p:pic>
     </p:spTree>
     <p:extLst>
       <p:ext uri="{BB962C8B-B14F-4D97-AF65-F5344CB8AC3E}">
@@ -7383,7 +7206,7 @@
 </p:sld>
 </file>
 
-<file path=ppt/slides/slide9.xml><?xml version="1.0" encoding="utf-8"?>
+<file path=ppt/slides/slide8.xml><?xml version="1.0" encoding="utf-8"?>
 <p:sld xmlns:a="http://schemas.openxmlformats.org/drawingml/2006/main" xmlns:r="http://schemas.openxmlformats.org/officeDocument/2006/relationships" xmlns:p="http://schemas.openxmlformats.org/presentationml/2006/main">
   <p:cSld>
     <p:spTree>
@@ -7448,7 +7271,7 @@
             <a:fld id="{F38DF745-7D3F-47F4-83A3-874385CFAA69}" type="slidenum">
               <a:rPr lang="en-US" smtClean="0"/>
               <a:pPr/>
-              <a:t>9</a:t>
+              <a:t>8</a:t>
             </a:fld>
             <a:endParaRPr lang="en-US"/>
           </a:p>
@@ -7463,14 +7286,14 @@
           <p:nvPr>
             <p:extLst>
               <p:ext uri="{D42A27DB-BD31-4B8C-83A1-F6EECF244321}">
-                <p14:modId xmlns:p14="http://schemas.microsoft.com/office/powerpoint/2010/main" val="94436742"/>
+                <p14:modId xmlns:p14="http://schemas.microsoft.com/office/powerpoint/2010/main" val="1419755908"/>
               </p:ext>
             </p:extLst>
           </p:nvPr>
         </p:nvGraphicFramePr>
         <p:xfrm>
-          <a:off x="142874" y="863423"/>
-          <a:ext cx="8763000" cy="5647584"/>
+          <a:off x="111124" y="863423"/>
+          <a:ext cx="8763000" cy="5668248"/>
         </p:xfrm>
         <a:graphic>
           <a:graphicData uri="http://schemas.openxmlformats.org/drawingml/2006/table">
@@ -7490,7 +7313,7 @@
                     <a:bodyPr/>
                     <a:lstStyle/>
                     <a:p>
-                      <a:endParaRPr lang="en-US" i="0" dirty="0"/>
+                      <a:endParaRPr lang="en-US" sz="2000" i="0" dirty="0"/>
                     </a:p>
                   </a:txBody>
                   <a:tcPr/>
@@ -7532,13 +7355,13 @@
                         <a:defRPr/>
                       </a:pPr>
                       <a:r>
-                        <a:rPr lang="en-US" sz="1800" i="0" baseline="0" dirty="0" smtClean="0"/>
+                        <a:rPr lang="en-US" sz="2000" i="0" baseline="0" dirty="0" smtClean="0"/>
                         <a:t>RMA Operations</a:t>
                       </a:r>
-                      <a:endParaRPr lang="en-US" sz="1800" i="0" dirty="0" smtClean="0"/>
+                      <a:endParaRPr lang="en-US" sz="2000" i="0" dirty="0" smtClean="0"/>
                     </a:p>
                     <a:p>
-                      <a:endParaRPr lang="en-US" dirty="0"/>
+                      <a:endParaRPr lang="en-US" sz="2000" dirty="0"/>
                     </a:p>
                   </a:txBody>
                   <a:tcPr/>
@@ -7549,10 +7372,10 @@
                     <a:lstStyle/>
                     <a:p>
                       <a:r>
-                        <a:rPr lang="en-US" dirty="0" smtClean="0"/>
+                        <a:rPr lang="en-US" sz="2000" dirty="0" smtClean="0"/>
                         <a:t>Synchronization Operations</a:t>
                       </a:r>
-                      <a:endParaRPr lang="en-US" dirty="0"/>
+                      <a:endParaRPr lang="en-US" sz="2000" dirty="0"/>
                     </a:p>
                   </a:txBody>
                   <a:tcPr/>
@@ -7582,17 +7405,17 @@
                         <a:defRPr/>
                       </a:pPr>
                       <a:r>
-                        <a:rPr lang="en-US" sz="1800" i="0" dirty="0" smtClean="0"/>
+                        <a:rPr lang="en-US" sz="2000" i="0" dirty="0" smtClean="0"/>
                         <a:t>Symmetric</a:t>
                       </a:r>
                       <a:r>
-                        <a:rPr lang="en-US" sz="1800" i="0" baseline="0" dirty="0" smtClean="0"/>
+                        <a:rPr lang="en-US" sz="2000" i="0" baseline="0" dirty="0" smtClean="0"/>
                         <a:t> variable checking </a:t>
                       </a:r>
-                      <a:endParaRPr lang="en-US" sz="1800" i="0" dirty="0" smtClean="0"/>
+                      <a:endParaRPr lang="en-US" sz="2000" i="0" dirty="0" smtClean="0"/>
                     </a:p>
                     <a:p>
-                      <a:endParaRPr lang="en-US" dirty="0"/>
+                      <a:endParaRPr lang="en-US" sz="2000" dirty="0"/>
                     </a:p>
                   </a:txBody>
                   <a:tcPr/>
@@ -7618,7 +7441,7 @@
                     <a:p>
                       <a:r>
                         <a:rPr lang="en-US" sz="2000" i="0" dirty="0" smtClean="0"/>
-                        <a:t>x</a:t>
+                        <a:t>X</a:t>
                       </a:r>
                       <a:endParaRPr lang="en-US" sz="2000" i="0" dirty="0"/>
                     </a:p>
@@ -7664,12 +7487,12 @@
                         <a:defRPr/>
                       </a:pPr>
                       <a:r>
-                        <a:rPr lang="en-US" sz="1800" i="0" dirty="0" smtClean="0"/>
+                        <a:rPr lang="en-US" sz="2000" i="0" dirty="0" smtClean="0"/>
                         <a:t>Bounds checking</a:t>
                       </a:r>
                     </a:p>
                     <a:p>
-                      <a:endParaRPr lang="en-US" dirty="0"/>
+                      <a:endParaRPr lang="en-US" sz="2000" dirty="0"/>
                     </a:p>
                   </a:txBody>
                   <a:tcPr/>
@@ -7724,14 +7547,14 @@
                     <a:lstStyle/>
                     <a:p>
                       <a:r>
-                        <a:rPr lang="en-US" sz="1800" i="0" dirty="0" smtClean="0"/>
+                        <a:rPr lang="en-US" sz="2000" i="0" dirty="0" smtClean="0"/>
                         <a:t>Type</a:t>
                       </a:r>
                       <a:r>
-                        <a:rPr lang="en-US" sz="1800" i="0" baseline="0" dirty="0" smtClean="0"/>
+                        <a:rPr lang="en-US" sz="2000" i="0" baseline="0" dirty="0" smtClean="0"/>
                         <a:t> checking</a:t>
                       </a:r>
-                      <a:endParaRPr lang="en-US" dirty="0"/>
+                      <a:endParaRPr lang="en-US" sz="2000" dirty="0"/>
                     </a:p>
                   </a:txBody>
                   <a:tcPr/>
@@ -7804,8 +7627,17 @@
                       </a:pPr>
                       <a:r>
                         <a:rPr lang="en-US" sz="2000" dirty="0" smtClean="0"/>
-                        <a:t>Variable initialization</a:t>
+                        <a:t>Pointer</a:t>
                       </a:r>
+                      <a:r>
+                        <a:rPr lang="en-US" sz="2000" baseline="0" dirty="0" smtClean="0"/>
+                        <a:t> </a:t>
+                      </a:r>
+                      <a:r>
+                        <a:rPr lang="en-US" sz="2000" dirty="0" smtClean="0"/>
+                        <a:t>initialization</a:t>
+                      </a:r>
+                      <a:endParaRPr lang="en-US" sz="2000" dirty="0" smtClean="0"/>
                     </a:p>
                     <a:p>
                       <a:endParaRPr lang="en-US" sz="2000" i="0" dirty="0"/>
@@ -7914,6 +7746,277 @@
     <p:extLst>
       <p:ext uri="{BB962C8B-B14F-4D97-AF65-F5344CB8AC3E}">
         <p14:creationId xmlns:p14="http://schemas.microsoft.com/office/powerpoint/2010/main" val="1775416868"/>
+      </p:ext>
+    </p:extLst>
+  </p:cSld>
+  <p:clrMapOvr>
+    <a:masterClrMapping/>
+  </p:clrMapOvr>
+  <p:timing>
+    <p:tnLst>
+      <p:par>
+        <p:cTn xmlns:p14="http://schemas.microsoft.com/office/powerpoint/2010/main" id="1" dur="indefinite" restart="never" nodeType="tmRoot"/>
+      </p:par>
+    </p:tnLst>
+  </p:timing>
+</p:sld>
+</file>
+
+<file path=ppt/slides/slide9.xml><?xml version="1.0" encoding="utf-8"?>
+<p:sld xmlns:a="http://schemas.openxmlformats.org/drawingml/2006/main" xmlns:r="http://schemas.openxmlformats.org/officeDocument/2006/relationships" xmlns:p="http://schemas.openxmlformats.org/presentationml/2006/main">
+  <p:cSld>
+    <p:spTree>
+      <p:nvGrpSpPr>
+        <p:cNvPr id="1" name=""/>
+        <p:cNvGrpSpPr/>
+        <p:nvPr/>
+      </p:nvGrpSpPr>
+      <p:grpSpPr>
+        <a:xfrm>
+          <a:off x="0" y="0"/>
+          <a:ext cx="0" cy="0"/>
+          <a:chOff x="0" y="0"/>
+          <a:chExt cx="0" cy="0"/>
+        </a:xfrm>
+      </p:grpSpPr>
+      <p:sp>
+        <p:nvSpPr>
+          <p:cNvPr id="2" name="Title 1"/>
+          <p:cNvSpPr>
+            <a:spLocks noGrp="1"/>
+          </p:cNvSpPr>
+          <p:nvPr>
+            <p:ph type="title"/>
+          </p:nvPr>
+        </p:nvSpPr>
+        <p:spPr/>
+        <p:txBody>
+          <a:bodyPr/>
+          <a:lstStyle/>
+          <a:p>
+            <a:r>
+              <a:rPr lang="en-US" dirty="0" smtClean="0"/>
+              <a:t>How to install</a:t>
+            </a:r>
+            <a:endParaRPr lang="en-US" dirty="0"/>
+          </a:p>
+        </p:txBody>
+      </p:sp>
+      <p:sp>
+        <p:nvSpPr>
+          <p:cNvPr id="9" name="Slide Number Placeholder 8"/>
+          <p:cNvSpPr>
+            <a:spLocks noGrp="1"/>
+          </p:cNvSpPr>
+          <p:nvPr>
+            <p:ph type="sldNum" sz="quarter" idx="12"/>
+          </p:nvPr>
+        </p:nvSpPr>
+        <p:spPr/>
+        <p:txBody>
+          <a:bodyPr/>
+          <a:lstStyle/>
+          <a:p>
+            <a:fld id="{F38DF745-7D3F-47F4-83A3-874385CFAA69}" type="slidenum">
+              <a:rPr lang="en-US" smtClean="0"/>
+              <a:pPr/>
+              <a:t>9</a:t>
+            </a:fld>
+            <a:endParaRPr lang="en-US" dirty="0"/>
+          </a:p>
+        </p:txBody>
+      </p:sp>
+      <p:sp>
+        <p:nvSpPr>
+          <p:cNvPr id="3" name="TextBox 2"/>
+          <p:cNvSpPr txBox="1"/>
+          <p:nvPr/>
+        </p:nvSpPr>
+        <p:spPr>
+          <a:xfrm>
+            <a:off x="2254250" y="2905125"/>
+            <a:ext cx="184666" cy="369332"/>
+          </a:xfrm>
+          <a:prstGeom prst="rect">
+            <a:avLst/>
+          </a:prstGeom>
+          <a:noFill/>
+        </p:spPr>
+        <p:txBody>
+          <a:bodyPr wrap="none" rtlCol="0">
+            <a:spAutoFit/>
+          </a:bodyPr>
+          <a:lstStyle/>
+          <a:p>
+            <a:endParaRPr lang="en-US" dirty="0"/>
+          </a:p>
+        </p:txBody>
+      </p:sp>
+      <p:sp>
+        <p:nvSpPr>
+          <p:cNvPr id="7" name="Content Placeholder 2"/>
+          <p:cNvSpPr>
+            <a:spLocks noGrp="1"/>
+          </p:cNvSpPr>
+          <p:nvPr>
+            <p:ph idx="1"/>
+          </p:nvPr>
+        </p:nvSpPr>
+        <p:spPr>
+          <a:xfrm>
+            <a:off x="154669" y="1932398"/>
+            <a:ext cx="8229600" cy="4533900"/>
+          </a:xfrm>
+        </p:spPr>
+        <p:txBody>
+          <a:bodyPr>
+            <a:normAutofit/>
+          </a:bodyPr>
+          <a:lstStyle/>
+          <a:p>
+            <a:pPr marL="285750" indent="-285750">
+              <a:buFont typeface="Wingdings" charset="2"/>
+              <a:buChar char="§"/>
+            </a:pPr>
+            <a:r>
+              <a:rPr lang="en-US" sz="2800" b="0" dirty="0"/>
+              <a:t>The project website for the </a:t>
+            </a:r>
+            <a:r>
+              <a:rPr lang="en-US" sz="2800" b="0" dirty="0" err="1"/>
+              <a:t>OpenSHMEM</a:t>
+            </a:r>
+            <a:r>
+              <a:rPr lang="en-US" sz="2800" b="0" dirty="0"/>
+              <a:t> </a:t>
+            </a:r>
+            <a:r>
+              <a:rPr lang="en-US" sz="2800" b="0" dirty="0" smtClean="0"/>
+              <a:t>Analyzer</a:t>
+            </a:r>
+            <a:endParaRPr lang="en-US" sz="2800" b="0" dirty="0"/>
+          </a:p>
+          <a:p>
+            <a:r>
+              <a:rPr lang="en-US" sz="2800" b="0" dirty="0" smtClean="0"/>
+              <a:t>	http</a:t>
+            </a:r>
+            <a:r>
+              <a:rPr lang="en-US" sz="2800" b="0" dirty="0"/>
+              <a:t>://</a:t>
+            </a:r>
+            <a:r>
+              <a:rPr lang="en-US" sz="2800" b="0" dirty="0" err="1"/>
+              <a:t>www.openshmem.org</a:t>
+            </a:r>
+            <a:r>
+              <a:rPr lang="en-US" sz="2800" b="0" dirty="0"/>
+              <a:t>/</a:t>
+            </a:r>
+            <a:r>
+              <a:rPr lang="en-US" sz="2800" b="0" dirty="0" smtClean="0"/>
+              <a:t>OSA</a:t>
+            </a:r>
+            <a:endParaRPr lang="en-US" sz="2800" b="0" dirty="0"/>
+          </a:p>
+          <a:p>
+            <a:pPr marL="285750" indent="-285750">
+              <a:buFont typeface="Wingdings" charset="2"/>
+              <a:buChar char="§"/>
+            </a:pPr>
+            <a:r>
+              <a:rPr lang="en-US" sz="2800" b="0" dirty="0" smtClean="0"/>
+              <a:t>Install </a:t>
+            </a:r>
+            <a:r>
+              <a:rPr lang="en-US" sz="2800" b="0" dirty="0" err="1" smtClean="0"/>
+              <a:t>OpenUH</a:t>
+            </a:r>
+            <a:r>
+              <a:rPr lang="en-US" sz="2800" b="0" dirty="0" smtClean="0"/>
+              <a:t> (&gt;= 3.0.38) </a:t>
+            </a:r>
+            <a:endParaRPr lang="en-US" sz="2800" b="0" dirty="0"/>
+          </a:p>
+          <a:p>
+            <a:r>
+              <a:rPr lang="en-US" sz="2800" b="0" dirty="0" smtClean="0"/>
+              <a:t>	</a:t>
+            </a:r>
+            <a:r>
+              <a:rPr lang="en-US" sz="2800" b="0" dirty="0" smtClean="0"/>
+              <a:t>http</a:t>
+            </a:r>
+            <a:r>
+              <a:rPr lang="en-US" sz="2800" b="0" dirty="0"/>
+              <a:t>://</a:t>
+            </a:r>
+            <a:r>
+              <a:rPr lang="en-US" sz="2800" b="0" dirty="0" err="1"/>
+              <a:t>web.cs.uh.edu</a:t>
+            </a:r>
+            <a:r>
+              <a:rPr lang="en-US" sz="2800" b="0" dirty="0"/>
+              <a:t>/~</a:t>
+            </a:r>
+            <a:r>
+              <a:rPr lang="en-US" sz="2800" b="0" dirty="0" err="1"/>
+              <a:t>openuh</a:t>
+            </a:r>
+            <a:r>
+              <a:rPr lang="en-US" sz="2800" b="0" dirty="0"/>
+              <a:t>/download</a:t>
+            </a:r>
+            <a:r>
+              <a:rPr lang="en-US" sz="2800" b="0" dirty="0" smtClean="0"/>
+              <a:t>/</a:t>
+            </a:r>
+            <a:endParaRPr lang="en-US" sz="2800" b="0" dirty="0" smtClean="0"/>
+          </a:p>
+          <a:p>
+            <a:pPr marL="285750" indent="-285750">
+              <a:buFont typeface="Wingdings" charset="2"/>
+              <a:buChar char="§"/>
+            </a:pPr>
+            <a:r>
+              <a:rPr lang="en-US" sz="2800" b="0" dirty="0" smtClean="0"/>
+              <a:t>Packages to Install:</a:t>
+            </a:r>
+          </a:p>
+          <a:p>
+            <a:pPr marL="742950" lvl="1" indent="-285750">
+              <a:buFont typeface="Wingdings" charset="2"/>
+              <a:buChar char="§"/>
+            </a:pPr>
+            <a:r>
+              <a:rPr lang="en-US" sz="2800" dirty="0" smtClean="0"/>
+              <a:t>Code2html</a:t>
+            </a:r>
+          </a:p>
+          <a:p>
+            <a:pPr marL="742950" lvl="1" indent="-285750">
+              <a:buFont typeface="Wingdings" charset="2"/>
+              <a:buChar char="§"/>
+            </a:pPr>
+            <a:r>
+              <a:rPr lang="en-US" sz="2800" dirty="0" err="1" smtClean="0"/>
+              <a:t>Graphviz</a:t>
+            </a:r>
+            <a:endParaRPr lang="en-US" sz="2800" dirty="0" smtClean="0"/>
+          </a:p>
+          <a:p>
+            <a:pPr marL="285750" indent="-285750">
+              <a:buFont typeface="Wingdings" charset="2"/>
+              <a:buChar char="§"/>
+            </a:pPr>
+            <a:endParaRPr lang="en-US" sz="2800" b="0" dirty="0" smtClean="0"/>
+          </a:p>
+        </p:txBody>
+      </p:sp>
+    </p:spTree>
+    <p:extLst>
+      <p:ext uri="{BB962C8B-B14F-4D97-AF65-F5344CB8AC3E}">
+        <p14:creationId xmlns:p14="http://schemas.microsoft.com/office/powerpoint/2010/main" val="2806564515"/>
       </p:ext>
     </p:extLst>
   </p:cSld>

</xml_diff>

<commit_message>
Add some features related to barrier matching analysis
</commit_message>
<xml_diff>
--- a/SHMEM-Analyzer.pptx
+++ b/SHMEM-Analyzer.pptx
@@ -206,7 +206,7 @@
           <a:p>
             <a:fld id="{468D709A-6F93-AB45-86F2-C0AA7B66AC74}" type="datetime1">
               <a:rPr lang="en-US" smtClean="0"/>
-              <a:t>9/6/14</a:t>
+              <a:t>9/8/14</a:t>
             </a:fld>
             <a:endParaRPr lang="en-US"/>
           </a:p>
@@ -372,7 +372,7 @@
           <a:p>
             <a:fld id="{854BB43F-43C0-CA46-9D03-411B571943D9}" type="datetime1">
               <a:rPr lang="en-US" smtClean="0"/>
-              <a:t>9/6/14</a:t>
+              <a:t>9/8/14</a:t>
             </a:fld>
             <a:endParaRPr lang="en-US"/>
           </a:p>
@@ -1754,7 +1754,7 @@
           <a:p>
             <a:fld id="{469B110A-2C91-A143-A0D6-D87B179152F8}" type="datetime4">
               <a:rPr lang="en-US" smtClean="0"/>
-              <a:t>September 6, 2014</a:t>
+              <a:t>September 8, 2014</a:t>
             </a:fld>
             <a:endParaRPr lang="en-US" dirty="0"/>
           </a:p>
@@ -2020,7 +2020,7 @@
           <a:p>
             <a:fld id="{3EC81CD4-BD3D-464B-9184-78FFC2E97AD9}" type="datetime4">
               <a:rPr lang="en-US" smtClean="0"/>
-              <a:t>September 6, 2014</a:t>
+              <a:t>September 8, 2014</a:t>
             </a:fld>
             <a:endParaRPr lang="en-US"/>
           </a:p>
@@ -2196,7 +2196,7 @@
           <a:p>
             <a:fld id="{CA6DA6AF-E785-EF40-A581-BDE4D55F4ABA}" type="datetime4">
               <a:rPr lang="en-US" smtClean="0"/>
-              <a:t>September 6, 2014</a:t>
+              <a:t>September 8, 2014</a:t>
             </a:fld>
             <a:endParaRPr lang="en-US"/>
           </a:p>
@@ -2362,7 +2362,7 @@
           <a:p>
             <a:fld id="{457379AA-32F7-BC40-9E82-84EE7D640F64}" type="datetime4">
               <a:rPr lang="en-US" smtClean="0"/>
-              <a:t>September 6, 2014</a:t>
+              <a:t>September 8, 2014</a:t>
             </a:fld>
             <a:endParaRPr lang="en-US"/>
           </a:p>
@@ -2612,7 +2612,7 @@
           <a:p>
             <a:fld id="{3F46DDC9-55D1-6447-8F23-EB2832B98E47}" type="datetime4">
               <a:rPr lang="en-US" smtClean="0"/>
-              <a:t>September 6, 2014</a:t>
+              <a:t>September 8, 2014</a:t>
             </a:fld>
             <a:endParaRPr lang="en-US" dirty="0"/>
           </a:p>
@@ -2896,7 +2896,7 @@
           <a:p>
             <a:fld id="{BDF42959-6026-844A-8D3C-629F6071B1F6}" type="datetime4">
               <a:rPr lang="en-US" smtClean="0"/>
-              <a:t>September 6, 2014</a:t>
+              <a:t>September 8, 2014</a:t>
             </a:fld>
             <a:endParaRPr lang="en-US"/>
           </a:p>
@@ -3336,7 +3336,7 @@
           <a:p>
             <a:fld id="{AFAD780A-6800-8948-A870-36DD091D20EA}" type="datetime4">
               <a:rPr lang="en-US" smtClean="0"/>
-              <a:t>September 6, 2014</a:t>
+              <a:t>September 8, 2014</a:t>
             </a:fld>
             <a:endParaRPr lang="en-US"/>
           </a:p>
@@ -3450,7 +3450,7 @@
           <a:p>
             <a:fld id="{137FFFEB-36CF-1E46-8135-84F055D6EA5C}" type="datetime4">
               <a:rPr lang="en-US" smtClean="0"/>
-              <a:t>September 6, 2014</a:t>
+              <a:t>September 8, 2014</a:t>
             </a:fld>
             <a:endParaRPr lang="en-US"/>
           </a:p>
@@ -3541,7 +3541,7 @@
           <a:p>
             <a:fld id="{009ED1FD-968B-914C-B6B5-7B0352053ED7}" type="datetime4">
               <a:rPr lang="en-US" smtClean="0"/>
-              <a:t>September 6, 2014</a:t>
+              <a:t>September 8, 2014</a:t>
             </a:fld>
             <a:endParaRPr lang="en-US"/>
           </a:p>
@@ -3784,7 +3784,7 @@
           <a:p>
             <a:fld id="{0FB22B12-5DCA-944A-90D8-136439A8444C}" type="datetime4">
               <a:rPr lang="en-US" smtClean="0"/>
-              <a:t>September 6, 2014</a:t>
+              <a:t>September 8, 2014</a:t>
             </a:fld>
             <a:endParaRPr lang="en-US"/>
           </a:p>
@@ -4079,7 +4079,7 @@
           <a:p>
             <a:fld id="{412CBBBA-55E0-1146-80D4-5ECBA942EF9C}" type="datetime4">
               <a:rPr lang="en-US" smtClean="0"/>
-              <a:t>September 6, 2014</a:t>
+              <a:t>September 8, 2014</a:t>
             </a:fld>
             <a:endParaRPr lang="en-US"/>
           </a:p>
@@ -4374,7 +4374,7 @@
           <a:p>
             <a:fld id="{B478DFC0-2A2A-DE4F-8853-E62D51D9AECD}" type="datetime4">
               <a:rPr lang="en-US" smtClean="0"/>
-              <a:t>September 6, 2014</a:t>
+              <a:t>September 8, 2014</a:t>
             </a:fld>
             <a:endParaRPr lang="en-US" dirty="0"/>
           </a:p>
@@ -5136,11 +5136,7 @@
             </a:pPr>
             <a:r>
               <a:rPr lang="en-US" sz="2800" dirty="0" smtClean="0"/>
-              <a:t>Visualization of results and manipulating </a:t>
-            </a:r>
-            <a:r>
-              <a:rPr lang="en-US" sz="2800" dirty="0" smtClean="0"/>
-              <a:t>graphs</a:t>
+              <a:t>Visualization of results and manipulating graphs</a:t>
             </a:r>
           </a:p>
           <a:p>
@@ -5416,11 +5412,7 @@
           <a:p>
             <a:r>
               <a:rPr lang="en-US" dirty="0" smtClean="0"/>
-              <a:t>Current </a:t>
-            </a:r>
-            <a:r>
-              <a:rPr lang="en-US" dirty="0" smtClean="0"/>
-              <a:t>work</a:t>
+              <a:t>Current work</a:t>
             </a:r>
             <a:endParaRPr lang="en-US" dirty="0"/>
           </a:p>
@@ -5484,15 +5476,7 @@
             </a:r>
             <a:r>
               <a:rPr lang="en-US" sz="2800" b="0" dirty="0" smtClean="0"/>
-              <a:t> </a:t>
-            </a:r>
-            <a:r>
-              <a:rPr lang="en-US" sz="2800" b="0" dirty="0" smtClean="0"/>
-              <a:t>Analyzer </a:t>
-            </a:r>
-            <a:r>
-              <a:rPr lang="en-US" sz="2800" b="0" dirty="0" smtClean="0"/>
-              <a:t>to PGAS using the Parallel IR of </a:t>
+              <a:t> Analyzer to PGAS using the Parallel IR of </a:t>
             </a:r>
             <a:r>
               <a:rPr lang="en-US" sz="2800" b="0" dirty="0" err="1" smtClean="0"/>
@@ -5876,9 +5860,6 @@
               </a:rPr>
               <a:t>Features</a:t>
             </a:r>
-            <a:endParaRPr lang="en-US" sz="3200" b="0" dirty="0" smtClean="0">
-              <a:cs typeface="Times New Roman"/>
-            </a:endParaRPr>
           </a:p>
           <a:p>
             <a:pPr marL="457200" indent="-457200">
@@ -5955,19 +5936,7 @@
               <a:rPr lang="en-US" sz="3200" b="0" dirty="0" smtClean="0">
                 <a:cs typeface="Times New Roman"/>
               </a:rPr>
-              <a:t>Current</a:t>
-            </a:r>
-            <a:r>
-              <a:rPr lang="en-US" sz="3200" b="0" dirty="0" smtClean="0">
-                <a:cs typeface="Times New Roman"/>
-              </a:rPr>
-              <a:t> </a:t>
-            </a:r>
-            <a:r>
-              <a:rPr lang="en-US" sz="3200" b="0" dirty="0" smtClean="0">
-                <a:cs typeface="Times New Roman"/>
-              </a:rPr>
-              <a:t>Work </a:t>
+              <a:t>Current Work </a:t>
             </a:r>
             <a:endParaRPr lang="en-US" sz="3200" b="0" dirty="0">
               <a:cs typeface="Times New Roman"/>
@@ -6077,7 +6046,7 @@
         </p:spPr>
         <p:txBody>
           <a:bodyPr>
-            <a:normAutofit/>
+            <a:normAutofit fontScale="92500" lnSpcReduction="20000"/>
           </a:bodyPr>
           <a:lstStyle/>
           <a:p>
@@ -6120,6 +6089,33 @@
                 <a:cs typeface="Times New Roman"/>
               </a:rPr>
               <a:t>OpenSHMEM</a:t>
+            </a:r>
+            <a:endParaRPr lang="en-US" sz="3200" b="0" dirty="0" smtClean="0">
+              <a:cs typeface="Times New Roman"/>
+            </a:endParaRPr>
+          </a:p>
+          <a:p>
+            <a:pPr marL="914400" lvl="1" indent="-457200">
+              <a:buFont typeface="Wingdings" charset="2"/>
+              <a:buChar char="§"/>
+            </a:pPr>
+            <a:r>
+              <a:rPr lang="en-US" sz="3200" dirty="0" err="1" smtClean="0">
+                <a:cs typeface="Times New Roman"/>
+              </a:rPr>
+              <a:t>OpenSHMEM</a:t>
+            </a:r>
+            <a:r>
+              <a:rPr lang="en-US" sz="3200" dirty="0" smtClean="0">
+                <a:cs typeface="Times New Roman"/>
+              </a:rPr>
+              <a:t> specification allows unaligned barriers</a:t>
+            </a:r>
+            <a:r>
+              <a:rPr lang="en-US" sz="3200" dirty="0">
+                <a:cs typeface="Times New Roman"/>
+              </a:rPr>
+              <a:t>	</a:t>
             </a:r>
             <a:endParaRPr lang="en-US" sz="3200" b="0" dirty="0" smtClean="0">
               <a:cs typeface="Times New Roman"/>
@@ -6256,7 +6252,12 @@
             <p:ph type="title"/>
           </p:nvPr>
         </p:nvSpPr>
-        <p:spPr/>
+        <p:spPr>
+          <a:xfrm>
+            <a:off x="457200" y="63500"/>
+            <a:ext cx="5791200" cy="1079818"/>
+          </a:xfrm>
+        </p:spPr>
         <p:txBody>
           <a:bodyPr/>
           <a:lstStyle/>
@@ -6277,8 +6278,8 @@
         </p:nvSpPr>
         <p:spPr>
           <a:xfrm>
-            <a:off x="-3177" y="1708032"/>
-            <a:ext cx="8401051" cy="3180358"/>
+            <a:off x="-3177" y="1342907"/>
+            <a:ext cx="8401051" cy="5248616"/>
           </a:xfrm>
           <a:prstGeom prst="rect">
             <a:avLst/>
@@ -6324,7 +6325,11 @@
             </a:r>
             <a:r>
               <a:rPr lang="en-US" sz="2800" dirty="0"/>
-              <a:t>code analysis and correctness checking capabilities</a:t>
+              <a:t>code analysis and correctness checking </a:t>
+            </a:r>
+            <a:r>
+              <a:rPr lang="en-US" sz="2800" dirty="0" smtClean="0"/>
+              <a:t>capabilities</a:t>
             </a:r>
           </a:p>
           <a:p>
@@ -6337,17 +6342,37 @@
             </a:pPr>
             <a:r>
               <a:rPr lang="en-US" sz="2800" dirty="0" smtClean="0"/>
-              <a:t>Graphical </a:t>
+              <a:t>Verification at</a:t>
+            </a:r>
+            <a:r>
+              <a:rPr lang="en-US" sz="2800" dirty="0"/>
+              <a:t>	</a:t>
             </a:r>
             <a:r>
               <a:rPr lang="en-US" sz="2800" dirty="0" smtClean="0"/>
-              <a:t>and textual display of </a:t>
+              <a:t>compile time that all </a:t>
+            </a:r>
+            <a:r>
+              <a:rPr lang="en-US" sz="2800" dirty="0" err="1" smtClean="0"/>
+              <a:t>OpenSHMEM</a:t>
             </a:r>
             <a:r>
               <a:rPr lang="en-US" sz="2800" dirty="0" smtClean="0"/>
-              <a:t>analyses for the source program</a:t>
-            </a:r>
-            <a:endParaRPr lang="en-US" sz="2800" dirty="0" smtClean="0"/>
+              <a:t> library calls are using the appropriate classes of data as required by</a:t>
+            </a:r>
+            <a:r>
+              <a:rPr lang="en-US" sz="2800" dirty="0"/>
+              <a:t>	</a:t>
+            </a:r>
+            <a:r>
+              <a:rPr lang="en-US" sz="2800" dirty="0" smtClean="0"/>
+              <a:t>Specification 1.0</a:t>
+            </a:r>
+            <a:r>
+              <a:rPr lang="en-US" sz="2800" dirty="0"/>
+              <a:t>	</a:t>
+            </a:r>
+            <a:endParaRPr lang="en-US" sz="2800" dirty="0"/>
           </a:p>
           <a:p>
             <a:pPr marL="457200" indent="-457200">
@@ -6359,12 +6384,46 @@
             </a:pPr>
             <a:r>
               <a:rPr lang="en-US" sz="2800" dirty="0" smtClean="0"/>
+              <a:t>Graphical and textual display of analyses for the source program</a:t>
+            </a:r>
+          </a:p>
+          <a:p>
+            <a:pPr marL="457200" indent="-457200">
+              <a:lnSpc>
+                <a:spcPct val="120000"/>
+              </a:lnSpc>
+              <a:buFont typeface="Wingdings" charset="2"/>
+              <a:buChar char="§"/>
+            </a:pPr>
+            <a:r>
+              <a:rPr lang="en-US" sz="2800" dirty="0" smtClean="0"/>
               <a:t>Intra</a:t>
             </a:r>
             <a:r>
               <a:rPr lang="en-US" sz="2800" dirty="0"/>
-              <a:t>-and Inter-procedural analysis </a:t>
-            </a:r>
+              <a:t>-and Inter-procedural </a:t>
+            </a:r>
+            <a:r>
+              <a:rPr lang="en-US" sz="2800" dirty="0" smtClean="0"/>
+              <a:t>analysis using </a:t>
+            </a:r>
+            <a:r>
+              <a:rPr lang="en-US" sz="2800" dirty="0" smtClean="0"/>
+              <a:t>IPA phase of the </a:t>
+            </a:r>
+            <a:r>
+              <a:rPr lang="en-US" sz="2800" dirty="0" err="1" smtClean="0"/>
+              <a:t>OpenUH</a:t>
+            </a:r>
+            <a:r>
+              <a:rPr lang="en-US" sz="2800" dirty="0" smtClean="0"/>
+              <a:t> compiler</a:t>
+            </a:r>
+            <a:r>
+              <a:rPr lang="en-US" sz="2800" dirty="0"/>
+              <a:t>.	</a:t>
+            </a:r>
+            <a:endParaRPr lang="en-US" sz="2800" dirty="0"/>
           </a:p>
         </p:txBody>
       </p:sp>
@@ -6548,11 +6607,7 @@
             </a:pPr>
             <a:r>
               <a:rPr lang="en-US" sz="2800" b="0" dirty="0" smtClean="0"/>
-              <a:t>Sophisticated intra</a:t>
-            </a:r>
-            <a:r>
-              <a:rPr lang="en-US" sz="2800" b="0" dirty="0" smtClean="0"/>
-              <a:t>- and inter-procedural analyses and optimizations</a:t>
+              <a:t>Sophisticated intra- and inter-procedural analyses and optimizations</a:t>
             </a:r>
           </a:p>
           <a:p>
@@ -6578,11 +6633,7 @@
             </a:r>
             <a:r>
               <a:rPr lang="en-US" sz="2800" b="0" dirty="0" smtClean="0"/>
-              <a:t> and</a:t>
-            </a:r>
-            <a:r>
-              <a:rPr lang="en-US" sz="2800" b="0" dirty="0" smtClean="0"/>
-              <a:t> CAF</a:t>
+              <a:t> and CAF</a:t>
             </a:r>
             <a:endParaRPr lang="en-US" sz="2800" dirty="0" smtClean="0"/>
           </a:p>
@@ -6806,7 +6857,6 @@
               <a:rPr lang="en-US" dirty="0" smtClean="0"/>
               <a:t>)</a:t>
             </a:r>
-            <a:endParaRPr lang="en-US" dirty="0" smtClean="0"/>
           </a:p>
           <a:p>
             <a:pPr algn="ctr"/>
@@ -6828,15 +6878,7 @@
             </a:r>
             <a:r>
               <a:rPr lang="en-US" dirty="0" smtClean="0"/>
-              <a:t>-analyzer </a:t>
-            </a:r>
-            <a:r>
-              <a:rPr lang="en-US" dirty="0" smtClean="0"/>
-              <a:t>*</a:t>
-            </a:r>
-            <a:r>
-              <a:rPr lang="en-US" dirty="0" smtClean="0"/>
-              <a:t>.-o </a:t>
+              <a:t>-analyzer *.-o </a:t>
             </a:r>
             <a:endParaRPr lang="en-US" dirty="0"/>
           </a:p>
@@ -6946,11 +6988,7 @@
                     <a:p>
                       <a:r>
                         <a:rPr lang="en-US" dirty="0" smtClean="0"/>
-                        <a:t>Pointer </a:t>
-                      </a:r>
-                      <a:r>
-                        <a:rPr lang="en-US" dirty="0" smtClean="0"/>
-                        <a:t>Initialization Checking</a:t>
+                        <a:t>Pointer Initialization Checking</a:t>
                       </a:r>
                       <a:endParaRPr lang="en-US" dirty="0"/>
                     </a:p>
@@ -7637,7 +7675,6 @@
                         <a:rPr lang="en-US" sz="2000" dirty="0" smtClean="0"/>
                         <a:t>initialization</a:t>
                       </a:r>
-                      <a:endParaRPr lang="en-US" sz="2000" dirty="0" smtClean="0"/>
                     </a:p>
                     <a:p>
                       <a:endParaRPr lang="en-US" sz="2000" i="0" dirty="0"/>
@@ -7941,11 +7978,7 @@
           <a:p>
             <a:r>
               <a:rPr lang="en-US" sz="2800" b="0" dirty="0" smtClean="0"/>
-              <a:t>	</a:t>
-            </a:r>
-            <a:r>
-              <a:rPr lang="en-US" sz="2800" b="0" dirty="0" smtClean="0"/>
-              <a:t>http</a:t>
+              <a:t>	http</a:t>
             </a:r>
             <a:r>
               <a:rPr lang="en-US" sz="2800" b="0" dirty="0"/>
@@ -7971,7 +8004,6 @@
               <a:rPr lang="en-US" sz="2800" b="0" dirty="0" smtClean="0"/>
               <a:t>/</a:t>
             </a:r>
-            <a:endParaRPr lang="en-US" sz="2800" b="0" dirty="0" smtClean="0"/>
           </a:p>
           <a:p>
             <a:pPr marL="285750" indent="-285750">

</xml_diff>

<commit_message>
Update the PDF of the SHMEM Analyzer
</commit_message>
<xml_diff>
--- a/SHMEM-Analyzer.pptx
+++ b/SHMEM-Analyzer.pptx
@@ -5596,7 +5596,7 @@
                   <a:srgbClr val="FF0000"/>
                 </a:solidFill>
               </a:rPr>
-              <a:t>Acknowledgment </a:t>
+              <a:t>Acknowledgments </a:t>
             </a:r>
             <a:endParaRPr lang="en-US" sz="3600" dirty="0">
               <a:solidFill>
@@ -6718,8 +6718,8 @@
         </p:nvSpPr>
         <p:spPr>
           <a:xfrm>
-            <a:off x="457200" y="31750"/>
-            <a:ext cx="8126022" cy="571500"/>
+            <a:off x="349250" y="95250"/>
+            <a:ext cx="8583222" cy="571500"/>
           </a:xfrm>
         </p:spPr>
         <p:txBody>
@@ -6730,11 +6730,15 @@
           <a:p>
             <a:r>
               <a:rPr lang="en-US" dirty="0" err="1" smtClean="0"/>
-              <a:t>Shmem</a:t>
+              <a:t>OpenShmem</a:t>
             </a:r>
             <a:r>
               <a:rPr lang="en-US" dirty="0" smtClean="0"/>
-              <a:t> Analyzer in </a:t>
+              <a:t> </a:t>
+            </a:r>
+            <a:r>
+              <a:rPr lang="en-US" dirty="0" smtClean="0"/>
+              <a:t>Analyzer in </a:t>
             </a:r>
             <a:r>
               <a:rPr lang="en-US" dirty="0" err="1" smtClean="0"/>

</xml_diff>